<commit_message>
Updated slides to have link to this repo:
</commit_message>
<xml_diff>
--- a/vnow-PresentationTemplate.pptx
+++ b/vnow-PresentationTemplate.pptx
@@ -389,14 +389,14 @@
           <a:effectLst/>
           <a:extLst>
             <a:ext uri="{909E8E84-426E-40dd-AFC4-6F175D3DCCD1}">
-              <a14:hiddenFill xmlns="" xmlns:a14="http://schemas.microsoft.com/office/drawing/2010/main">
+              <a14:hiddenFill xmlns:a14="http://schemas.microsoft.com/office/drawing/2010/main" xmlns="">
                 <a:solidFill>
                   <a:schemeClr val="accent1"/>
                 </a:solidFill>
               </a14:hiddenFill>
             </a:ext>
             <a:ext uri="{91240B29-F687-4f45-9708-019B960494DF}">
-              <a14:hiddenLine xmlns="" xmlns:a14="http://schemas.microsoft.com/office/drawing/2010/main" w="9525">
+              <a14:hiddenLine xmlns:a14="http://schemas.microsoft.com/office/drawing/2010/main" xmlns="" w="9525">
                 <a:solidFill>
                   <a:schemeClr val="tx1"/>
                 </a:solidFill>
@@ -406,7 +406,7 @@
               </a14:hiddenLine>
             </a:ext>
             <a:ext uri="{AF507438-7753-43e0-B8FC-AC1667EBCBE1}">
-              <a14:hiddenEffects xmlns="" xmlns:a14="http://schemas.microsoft.com/office/drawing/2010/main">
+              <a14:hiddenEffects xmlns:a14="http://schemas.microsoft.com/office/drawing/2010/main" xmlns="">
                 <a:effectLst>
                   <a:outerShdw dist="35921" dir="2700000" algn="ctr" rotWithShape="0">
                     <a:schemeClr val="bg2"/>
@@ -459,14 +459,14 @@
           <a:effectLst/>
           <a:extLst>
             <a:ext uri="{909E8E84-426E-40dd-AFC4-6F175D3DCCD1}">
-              <a14:hiddenFill xmlns="" xmlns:a14="http://schemas.microsoft.com/office/drawing/2010/main">
+              <a14:hiddenFill xmlns:a14="http://schemas.microsoft.com/office/drawing/2010/main" xmlns="">
                 <a:solidFill>
                   <a:schemeClr val="accent1"/>
                 </a:solidFill>
               </a14:hiddenFill>
             </a:ext>
             <a:ext uri="{91240B29-F687-4f45-9708-019B960494DF}">
-              <a14:hiddenLine xmlns="" xmlns:a14="http://schemas.microsoft.com/office/drawing/2010/main" w="9525">
+              <a14:hiddenLine xmlns:a14="http://schemas.microsoft.com/office/drawing/2010/main" xmlns="" w="9525">
                 <a:solidFill>
                   <a:schemeClr val="tx1"/>
                 </a:solidFill>
@@ -476,7 +476,7 @@
               </a14:hiddenLine>
             </a:ext>
             <a:ext uri="{AF507438-7753-43e0-B8FC-AC1667EBCBE1}">
-              <a14:hiddenEffects xmlns="" xmlns:a14="http://schemas.microsoft.com/office/drawing/2010/main">
+              <a14:hiddenEffects xmlns:a14="http://schemas.microsoft.com/office/drawing/2010/main" xmlns="">
                 <a:effectLst>
                   <a:outerShdw dist="35921" dir="2700000" algn="ctr" rotWithShape="0">
                     <a:schemeClr val="bg2"/>
@@ -534,17 +534,17 @@
           <a:effectLst/>
           <a:extLst>
             <a:ext uri="{FAA26D3D-D897-4be2-8F04-BA451C77F1D7}">
-              <ma14:placeholderFlag xmlns="" xmlns:ma14="http://schemas.microsoft.com/office/mac/drawingml/2011/main" val="1"/>
+              <ma14:placeholderFlag xmlns:ma14="http://schemas.microsoft.com/office/mac/drawingml/2011/main" xmlns="" val="1"/>
             </a:ext>
             <a:ext uri="{909E8E84-426E-40dd-AFC4-6F175D3DCCD1}">
-              <a14:hiddenFill xmlns="" xmlns:a14="http://schemas.microsoft.com/office/drawing/2010/main">
+              <a14:hiddenFill xmlns:a14="http://schemas.microsoft.com/office/drawing/2010/main" xmlns="">
                 <a:solidFill>
                   <a:srgbClr val="FFFFFF"/>
                 </a:solidFill>
               </a14:hiddenFill>
             </a:ext>
             <a:ext uri="{AF507438-7753-43e0-B8FC-AC1667EBCBE1}">
-              <a14:hiddenEffects xmlns="" xmlns:a14="http://schemas.microsoft.com/office/drawing/2010/main">
+              <a14:hiddenEffects xmlns:a14="http://schemas.microsoft.com/office/drawing/2010/main" xmlns="">
                 <a:effectLst>
                   <a:outerShdw blurRad="63500" dist="38099" dir="2700000" algn="ctr" rotWithShape="0">
                     <a:srgbClr val="000000">
@@ -555,7 +555,7 @@
               </a14:hiddenEffects>
             </a:ext>
             <a:ext uri="{53640926-AAD7-44d8-BBD7-CCE9431645EC}">
-              <a14:shadowObscured xmlns="" xmlns:a14="http://schemas.microsoft.com/office/drawing/2010/main" val="1"/>
+              <a14:shadowObscured xmlns:a14="http://schemas.microsoft.com/office/drawing/2010/main" xmlns="" val="1"/>
             </a:ext>
           </a:extLst>
         </p:spPr>
@@ -585,14 +585,14 @@
           <a:effectLst/>
           <a:extLst>
             <a:ext uri="{909E8E84-426E-40dd-AFC4-6F175D3DCCD1}">
-              <a14:hiddenFill xmlns="" xmlns:a14="http://schemas.microsoft.com/office/drawing/2010/main">
+              <a14:hiddenFill xmlns:a14="http://schemas.microsoft.com/office/drawing/2010/main" xmlns="">
                 <a:solidFill>
                   <a:schemeClr val="accent1"/>
                 </a:solidFill>
               </a14:hiddenFill>
             </a:ext>
             <a:ext uri="{91240B29-F687-4f45-9708-019B960494DF}">
-              <a14:hiddenLine xmlns="" xmlns:a14="http://schemas.microsoft.com/office/drawing/2010/main" w="9525">
+              <a14:hiddenLine xmlns:a14="http://schemas.microsoft.com/office/drawing/2010/main" xmlns="" w="9525">
                 <a:solidFill>
                   <a:schemeClr val="tx1"/>
                 </a:solidFill>
@@ -602,7 +602,7 @@
               </a14:hiddenLine>
             </a:ext>
             <a:ext uri="{AF507438-7753-43e0-B8FC-AC1667EBCBE1}">
-              <a14:hiddenEffects xmlns="" xmlns:a14="http://schemas.microsoft.com/office/drawing/2010/main">
+              <a14:hiddenEffects xmlns:a14="http://schemas.microsoft.com/office/drawing/2010/main" xmlns="">
                 <a:effectLst>
                   <a:outerShdw dist="35921" dir="2700000" algn="ctr" rotWithShape="0">
                     <a:schemeClr val="bg2"/>
@@ -681,14 +681,14 @@
           <a:effectLst/>
           <a:extLst>
             <a:ext uri="{909E8E84-426E-40dd-AFC4-6F175D3DCCD1}">
-              <a14:hiddenFill xmlns="" xmlns:a14="http://schemas.microsoft.com/office/drawing/2010/main">
+              <a14:hiddenFill xmlns:a14="http://schemas.microsoft.com/office/drawing/2010/main" xmlns="">
                 <a:solidFill>
                   <a:schemeClr val="accent1"/>
                 </a:solidFill>
               </a14:hiddenFill>
             </a:ext>
             <a:ext uri="{91240B29-F687-4f45-9708-019B960494DF}">
-              <a14:hiddenLine xmlns="" xmlns:a14="http://schemas.microsoft.com/office/drawing/2010/main" w="9525">
+              <a14:hiddenLine xmlns:a14="http://schemas.microsoft.com/office/drawing/2010/main" xmlns="" w="9525">
                 <a:solidFill>
                   <a:schemeClr val="tx1"/>
                 </a:solidFill>
@@ -698,7 +698,7 @@
               </a14:hiddenLine>
             </a:ext>
             <a:ext uri="{AF507438-7753-43e0-B8FC-AC1667EBCBE1}">
-              <a14:hiddenEffects xmlns="" xmlns:a14="http://schemas.microsoft.com/office/drawing/2010/main">
+              <a14:hiddenEffects xmlns:a14="http://schemas.microsoft.com/office/drawing/2010/main" xmlns="">
                 <a:effectLst>
                   <a:outerShdw dist="35921" dir="2700000" algn="ctr" rotWithShape="0">
                     <a:schemeClr val="bg2"/>
@@ -751,14 +751,14 @@
           <a:effectLst/>
           <a:extLst>
             <a:ext uri="{909E8E84-426E-40dd-AFC4-6F175D3DCCD1}">
-              <a14:hiddenFill xmlns="" xmlns:a14="http://schemas.microsoft.com/office/drawing/2010/main">
+              <a14:hiddenFill xmlns:a14="http://schemas.microsoft.com/office/drawing/2010/main" xmlns="">
                 <a:solidFill>
                   <a:schemeClr val="accent1"/>
                 </a:solidFill>
               </a14:hiddenFill>
             </a:ext>
             <a:ext uri="{91240B29-F687-4f45-9708-019B960494DF}">
-              <a14:hiddenLine xmlns="" xmlns:a14="http://schemas.microsoft.com/office/drawing/2010/main" w="9525">
+              <a14:hiddenLine xmlns:a14="http://schemas.microsoft.com/office/drawing/2010/main" xmlns="" w="9525">
                 <a:solidFill>
                   <a:schemeClr val="tx1"/>
                 </a:solidFill>
@@ -768,7 +768,7 @@
               </a14:hiddenLine>
             </a:ext>
             <a:ext uri="{AF507438-7753-43e0-B8FC-AC1667EBCBE1}">
-              <a14:hiddenEffects xmlns="" xmlns:a14="http://schemas.microsoft.com/office/drawing/2010/main">
+              <a14:hiddenEffects xmlns:a14="http://schemas.microsoft.com/office/drawing/2010/main" xmlns="">
                 <a:effectLst>
                   <a:outerShdw dist="35921" dir="2700000" algn="ctr" rotWithShape="0">
                     <a:schemeClr val="bg2"/>
@@ -965,7 +965,7 @@
           <a:noFill/>
           <a:extLst>
             <a:ext uri="{AF507438-7753-43e0-B8FC-AC1667EBCBE1}">
-              <a14:hiddenEffects xmlns="" xmlns:a14="http://schemas.microsoft.com/office/drawing/2010/main">
+              <a14:hiddenEffects xmlns:a14="http://schemas.microsoft.com/office/drawing/2010/main" xmlns="">
                 <a:effectLst>
                   <a:outerShdw blurRad="63500" dist="38099" dir="2700000" algn="ctr" rotWithShape="0">
                     <a:schemeClr val="bg2">
@@ -1129,7 +1129,7 @@
           <a:noFill/>
           <a:extLst>
             <a:ext uri="{AF507438-7753-43e0-B8FC-AC1667EBCBE1}">
-              <a14:hiddenEffects xmlns="" xmlns:a14="http://schemas.microsoft.com/office/drawing/2010/main">
+              <a14:hiddenEffects xmlns:a14="http://schemas.microsoft.com/office/drawing/2010/main" xmlns="">
                 <a:effectLst>
                   <a:outerShdw blurRad="63500" dist="38099" dir="2700000" algn="ctr" rotWithShape="0">
                     <a:schemeClr val="bg2">
@@ -1197,7 +1197,7 @@
           <a:noFill/>
           <a:extLst>
             <a:ext uri="{AF507438-7753-43e0-B8FC-AC1667EBCBE1}">
-              <a14:hiddenEffects xmlns="" xmlns:a14="http://schemas.microsoft.com/office/drawing/2010/main">
+              <a14:hiddenEffects xmlns:a14="http://schemas.microsoft.com/office/drawing/2010/main" xmlns="">
                 <a:effectLst>
                   <a:outerShdw blurRad="63500" dist="38099" dir="2700000" algn="ctr" rotWithShape="0">
                     <a:schemeClr val="bg2">
@@ -1361,7 +1361,7 @@
           <a:noFill/>
           <a:extLst>
             <a:ext uri="{AF507438-7753-43e0-B8FC-AC1667EBCBE1}">
-              <a14:hiddenEffects xmlns="" xmlns:a14="http://schemas.microsoft.com/office/drawing/2010/main">
+              <a14:hiddenEffects xmlns:a14="http://schemas.microsoft.com/office/drawing/2010/main" xmlns="">
                 <a:effectLst>
                   <a:outerShdw blurRad="63500" dist="38099" dir="2700000" algn="ctr" rotWithShape="0">
                     <a:schemeClr val="bg2">
@@ -1432,7 +1432,7 @@
           <a:noFill/>
           <a:extLst>
             <a:ext uri="{AF507438-7753-43e0-B8FC-AC1667EBCBE1}">
-              <a14:hiddenEffects xmlns="" xmlns:a14="http://schemas.microsoft.com/office/drawing/2010/main">
+              <a14:hiddenEffects xmlns:a14="http://schemas.microsoft.com/office/drawing/2010/main" xmlns="">
                 <a:effectLst>
                   <a:outerShdw blurRad="63500" dist="38099" dir="2700000" algn="ctr" rotWithShape="0">
                     <a:schemeClr val="bg2">
@@ -1596,7 +1596,7 @@
           <a:noFill/>
           <a:extLst>
             <a:ext uri="{AF507438-7753-43e0-B8FC-AC1667EBCBE1}">
-              <a14:hiddenEffects xmlns="" xmlns:a14="http://schemas.microsoft.com/office/drawing/2010/main">
+              <a14:hiddenEffects xmlns:a14="http://schemas.microsoft.com/office/drawing/2010/main" xmlns="">
                 <a:effectLst>
                   <a:outerShdw blurRad="63500" dist="38099" dir="2700000" algn="ctr" rotWithShape="0">
                     <a:schemeClr val="bg2">
@@ -1667,7 +1667,7 @@
           <a:noFill/>
           <a:extLst>
             <a:ext uri="{AF507438-7753-43e0-B8FC-AC1667EBCBE1}">
-              <a14:hiddenEffects xmlns="" xmlns:a14="http://schemas.microsoft.com/office/drawing/2010/main">
+              <a14:hiddenEffects xmlns:a14="http://schemas.microsoft.com/office/drawing/2010/main" xmlns="">
                 <a:effectLst>
                   <a:outerShdw blurRad="63500" dist="38099" dir="2700000" algn="ctr" rotWithShape="0">
                     <a:schemeClr val="bg2">
@@ -1831,7 +1831,7 @@
           <a:noFill/>
           <a:extLst>
             <a:ext uri="{AF507438-7753-43e0-B8FC-AC1667EBCBE1}">
-              <a14:hiddenEffects xmlns="" xmlns:a14="http://schemas.microsoft.com/office/drawing/2010/main">
+              <a14:hiddenEffects xmlns:a14="http://schemas.microsoft.com/office/drawing/2010/main" xmlns="">
                 <a:effectLst>
                   <a:outerShdw blurRad="63500" dist="38099" dir="2700000" algn="ctr" rotWithShape="0">
                     <a:schemeClr val="bg2">
@@ -1899,7 +1899,7 @@
           <a:noFill/>
           <a:extLst>
             <a:ext uri="{AF507438-7753-43e0-B8FC-AC1667EBCBE1}">
-              <a14:hiddenEffects xmlns="" xmlns:a14="http://schemas.microsoft.com/office/drawing/2010/main">
+              <a14:hiddenEffects xmlns:a14="http://schemas.microsoft.com/office/drawing/2010/main" xmlns="">
                 <a:effectLst>
                   <a:outerShdw blurRad="63500" dist="38099" dir="2700000" algn="ctr" rotWithShape="0">
                     <a:schemeClr val="bg2">
@@ -2063,7 +2063,7 @@
           <a:noFill/>
           <a:extLst>
             <a:ext uri="{AF507438-7753-43e0-B8FC-AC1667EBCBE1}">
-              <a14:hiddenEffects xmlns="" xmlns:a14="http://schemas.microsoft.com/office/drawing/2010/main">
+              <a14:hiddenEffects xmlns:a14="http://schemas.microsoft.com/office/drawing/2010/main" xmlns="">
                 <a:effectLst>
                   <a:outerShdw blurRad="63500" dist="38099" dir="2700000" algn="ctr" rotWithShape="0">
                     <a:schemeClr val="bg2">
@@ -2131,7 +2131,7 @@
           <a:noFill/>
           <a:extLst>
             <a:ext uri="{AF507438-7753-43e0-B8FC-AC1667EBCBE1}">
-              <a14:hiddenEffects xmlns="" xmlns:a14="http://schemas.microsoft.com/office/drawing/2010/main">
+              <a14:hiddenEffects xmlns:a14="http://schemas.microsoft.com/office/drawing/2010/main" xmlns="">
                 <a:effectLst>
                   <a:outerShdw blurRad="63500" dist="38099" dir="2700000" algn="ctr" rotWithShape="0">
                     <a:schemeClr val="bg2">
@@ -2295,7 +2295,7 @@
           <a:noFill/>
           <a:extLst>
             <a:ext uri="{AF507438-7753-43e0-B8FC-AC1667EBCBE1}">
-              <a14:hiddenEffects xmlns="" xmlns:a14="http://schemas.microsoft.com/office/drawing/2010/main">
+              <a14:hiddenEffects xmlns:a14="http://schemas.microsoft.com/office/drawing/2010/main" xmlns="">
                 <a:effectLst>
                   <a:outerShdw blurRad="63500" dist="38099" dir="2700000" algn="ctr" rotWithShape="0">
                     <a:schemeClr val="bg2">
@@ -2448,7 +2448,7 @@
           <a:noFill/>
           <a:extLst>
             <a:ext uri="{AF507438-7753-43e0-B8FC-AC1667EBCBE1}">
-              <a14:hiddenEffects xmlns="" xmlns:a14="http://schemas.microsoft.com/office/drawing/2010/main">
+              <a14:hiddenEffects xmlns:a14="http://schemas.microsoft.com/office/drawing/2010/main" xmlns="">
                 <a:effectLst>
                   <a:outerShdw blurRad="63500" dist="38099" dir="2700000" algn="ctr" rotWithShape="0">
                     <a:schemeClr val="bg2">
@@ -2612,7 +2612,7 @@
           <a:noFill/>
           <a:extLst>
             <a:ext uri="{AF507438-7753-43e0-B8FC-AC1667EBCBE1}">
-              <a14:hiddenEffects xmlns="" xmlns:a14="http://schemas.microsoft.com/office/drawing/2010/main">
+              <a14:hiddenEffects xmlns:a14="http://schemas.microsoft.com/office/drawing/2010/main" xmlns="">
                 <a:effectLst>
                   <a:outerShdw blurRad="63500" dist="38099" dir="2700000" algn="ctr" rotWithShape="0">
                     <a:schemeClr val="bg2">
@@ -2864,7 +2864,7 @@
           <a:noFill/>
           <a:extLst>
             <a:ext uri="{AF507438-7753-43e0-B8FC-AC1667EBCBE1}">
-              <a14:hiddenEffects xmlns="" xmlns:a14="http://schemas.microsoft.com/office/drawing/2010/main">
+              <a14:hiddenEffects xmlns:a14="http://schemas.microsoft.com/office/drawing/2010/main" xmlns="">
                 <a:effectLst>
                   <a:outerShdw blurRad="63500" dist="38099" dir="2700000" algn="ctr" rotWithShape="0">
                     <a:schemeClr val="bg2">
@@ -3028,7 +3028,7 @@
           <a:noFill/>
           <a:extLst>
             <a:ext uri="{AF507438-7753-43e0-B8FC-AC1667EBCBE1}">
-              <a14:hiddenEffects xmlns="" xmlns:a14="http://schemas.microsoft.com/office/drawing/2010/main">
+              <a14:hiddenEffects xmlns:a14="http://schemas.microsoft.com/office/drawing/2010/main" xmlns="">
                 <a:effectLst>
                   <a:outerShdw blurRad="63500" dist="38099" dir="2700000" algn="ctr" rotWithShape="0">
                     <a:schemeClr val="bg2">
@@ -3103,7 +3103,7 @@
           <a:noFill/>
           <a:extLst>
             <a:ext uri="{AF507438-7753-43e0-B8FC-AC1667EBCBE1}">
-              <a14:hiddenEffects xmlns="" xmlns:a14="http://schemas.microsoft.com/office/drawing/2010/main">
+              <a14:hiddenEffects xmlns:a14="http://schemas.microsoft.com/office/drawing/2010/main" xmlns="">
                 <a:effectLst>
                   <a:outerShdw blurRad="63500" dist="38099" dir="2700000" algn="ctr" rotWithShape="0">
                     <a:schemeClr val="bg2">
@@ -3267,7 +3267,7 @@
           <a:noFill/>
           <a:extLst>
             <a:ext uri="{AF507438-7753-43e0-B8FC-AC1667EBCBE1}">
-              <a14:hiddenEffects xmlns="" xmlns:a14="http://schemas.microsoft.com/office/drawing/2010/main">
+              <a14:hiddenEffects xmlns:a14="http://schemas.microsoft.com/office/drawing/2010/main" xmlns="">
                 <a:effectLst>
                   <a:outerShdw blurRad="63500" dist="38099" dir="2700000" algn="ctr" rotWithShape="0">
                     <a:schemeClr val="bg2">
@@ -3438,7 +3438,7 @@
           <a:noFill/>
           <a:extLst>
             <a:ext uri="{AF507438-7753-43e0-B8FC-AC1667EBCBE1}">
-              <a14:hiddenEffects xmlns="" xmlns:a14="http://schemas.microsoft.com/office/drawing/2010/main">
+              <a14:hiddenEffects xmlns:a14="http://schemas.microsoft.com/office/drawing/2010/main" xmlns="">
                 <a:effectLst>
                   <a:outerShdw blurRad="63500" dist="38099" dir="2700000" algn="ctr" rotWithShape="0">
                     <a:schemeClr val="bg2">
@@ -3602,7 +3602,7 @@
           <a:noFill/>
           <a:extLst>
             <a:ext uri="{AF507438-7753-43e0-B8FC-AC1667EBCBE1}">
-              <a14:hiddenEffects xmlns="" xmlns:a14="http://schemas.microsoft.com/office/drawing/2010/main">
+              <a14:hiddenEffects xmlns:a14="http://schemas.microsoft.com/office/drawing/2010/main" xmlns="">
                 <a:effectLst>
                   <a:outerShdw blurRad="63500" dist="38099" dir="2700000" algn="ctr" rotWithShape="0">
                     <a:schemeClr val="bg2">
@@ -3673,7 +3673,7 @@
           <a:noFill/>
           <a:extLst>
             <a:ext uri="{AF507438-7753-43e0-B8FC-AC1667EBCBE1}">
-              <a14:hiddenEffects xmlns="" xmlns:a14="http://schemas.microsoft.com/office/drawing/2010/main">
+              <a14:hiddenEffects xmlns:a14="http://schemas.microsoft.com/office/drawing/2010/main" xmlns="">
                 <a:effectLst>
                   <a:outerShdw blurRad="63500" dist="38099" dir="2700000" algn="ctr" rotWithShape="0">
                     <a:schemeClr val="bg2">
@@ -3837,7 +3837,7 @@
           <a:noFill/>
           <a:extLst>
             <a:ext uri="{AF507438-7753-43e0-B8FC-AC1667EBCBE1}">
-              <a14:hiddenEffects xmlns="" xmlns:a14="http://schemas.microsoft.com/office/drawing/2010/main">
+              <a14:hiddenEffects xmlns:a14="http://schemas.microsoft.com/office/drawing/2010/main" xmlns="">
                 <a:effectLst>
                   <a:outerShdw blurRad="63500" dist="38099" dir="2700000" algn="ctr" rotWithShape="0">
                     <a:schemeClr val="bg2">
@@ -6597,17 +6597,17 @@
           <a:effectLst/>
           <a:extLst>
             <a:ext uri="{FAA26D3D-D897-4be2-8F04-BA451C77F1D7}">
-              <ma14:placeholderFlag xmlns="" xmlns:ma14="http://schemas.microsoft.com/office/mac/drawingml/2011/main" val="1"/>
+              <ma14:placeholderFlag xmlns:ma14="http://schemas.microsoft.com/office/mac/drawingml/2011/main" xmlns="" val="1"/>
             </a:ext>
             <a:ext uri="{909E8E84-426E-40dd-AFC4-6F175D3DCCD1}">
-              <a14:hiddenFill xmlns="" xmlns:a14="http://schemas.microsoft.com/office/drawing/2010/main">
+              <a14:hiddenFill xmlns:a14="http://schemas.microsoft.com/office/drawing/2010/main" xmlns="">
                 <a:solidFill>
                   <a:schemeClr val="accent1"/>
                 </a:solidFill>
               </a14:hiddenFill>
             </a:ext>
             <a:ext uri="{91240B29-F687-4f45-9708-019B960494DF}">
-              <a14:hiddenLine xmlns="" xmlns:a14="http://schemas.microsoft.com/office/drawing/2010/main" w="9525">
+              <a14:hiddenLine xmlns:a14="http://schemas.microsoft.com/office/drawing/2010/main" xmlns="" w="9525">
                 <a:solidFill>
                   <a:schemeClr val="tx1"/>
                 </a:solidFill>
@@ -6617,7 +6617,7 @@
               </a14:hiddenLine>
             </a:ext>
             <a:ext uri="{AF507438-7753-43e0-B8FC-AC1667EBCBE1}">
-              <a14:hiddenEffects xmlns="" xmlns:a14="http://schemas.microsoft.com/office/drawing/2010/main">
+              <a14:hiddenEffects xmlns:a14="http://schemas.microsoft.com/office/drawing/2010/main" xmlns="">
                 <a:effectLst>
                   <a:outerShdw blurRad="63500" dist="38099" dir="2700000" algn="ctr" rotWithShape="0">
                     <a:schemeClr val="bg2">
@@ -6670,17 +6670,17 @@
           <a:effectLst/>
           <a:extLst>
             <a:ext uri="{FAA26D3D-D897-4be2-8F04-BA451C77F1D7}">
-              <ma14:placeholderFlag xmlns="" xmlns:ma14="http://schemas.microsoft.com/office/mac/drawingml/2011/main" val="1"/>
+              <ma14:placeholderFlag xmlns:ma14="http://schemas.microsoft.com/office/mac/drawingml/2011/main" xmlns="" val="1"/>
             </a:ext>
             <a:ext uri="{909E8E84-426E-40dd-AFC4-6F175D3DCCD1}">
-              <a14:hiddenFill xmlns="" xmlns:a14="http://schemas.microsoft.com/office/drawing/2010/main">
+              <a14:hiddenFill xmlns:a14="http://schemas.microsoft.com/office/drawing/2010/main" xmlns="">
                 <a:solidFill>
                   <a:schemeClr val="accent1"/>
                 </a:solidFill>
               </a14:hiddenFill>
             </a:ext>
             <a:ext uri="{91240B29-F687-4f45-9708-019B960494DF}">
-              <a14:hiddenLine xmlns="" xmlns:a14="http://schemas.microsoft.com/office/drawing/2010/main" w="9525">
+              <a14:hiddenLine xmlns:a14="http://schemas.microsoft.com/office/drawing/2010/main" xmlns="" w="9525">
                 <a:solidFill>
                   <a:schemeClr val="tx1"/>
                 </a:solidFill>
@@ -6690,7 +6690,7 @@
               </a14:hiddenLine>
             </a:ext>
             <a:ext uri="{AF507438-7753-43e0-B8FC-AC1667EBCBE1}">
-              <a14:hiddenEffects xmlns="" xmlns:a14="http://schemas.microsoft.com/office/drawing/2010/main">
+              <a14:hiddenEffects xmlns:a14="http://schemas.microsoft.com/office/drawing/2010/main" xmlns="">
                 <a:effectLst>
                   <a:outerShdw blurRad="63500" dist="38099" dir="2700000" algn="ctr" rotWithShape="0">
                     <a:schemeClr val="bg2">
@@ -6771,14 +6771,14 @@
           <a:effectLst/>
           <a:extLst>
             <a:ext uri="{909E8E84-426E-40dd-AFC4-6F175D3DCCD1}">
-              <a14:hiddenFill xmlns="" xmlns:a14="http://schemas.microsoft.com/office/drawing/2010/main">
+              <a14:hiddenFill xmlns:a14="http://schemas.microsoft.com/office/drawing/2010/main" xmlns="">
                 <a:solidFill>
                   <a:schemeClr val="accent1"/>
                 </a:solidFill>
               </a14:hiddenFill>
             </a:ext>
             <a:ext uri="{91240B29-F687-4f45-9708-019B960494DF}">
-              <a14:hiddenLine xmlns="" xmlns:a14="http://schemas.microsoft.com/office/drawing/2010/main" w="9525">
+              <a14:hiddenLine xmlns:a14="http://schemas.microsoft.com/office/drawing/2010/main" xmlns="" w="9525">
                 <a:solidFill>
                   <a:schemeClr val="tx1"/>
                 </a:solidFill>
@@ -6788,7 +6788,7 @@
               </a14:hiddenLine>
             </a:ext>
             <a:ext uri="{AF507438-7753-43e0-B8FC-AC1667EBCBE1}">
-              <a14:hiddenEffects xmlns="" xmlns:a14="http://schemas.microsoft.com/office/drawing/2010/main">
+              <a14:hiddenEffects xmlns:a14="http://schemas.microsoft.com/office/drawing/2010/main" xmlns="">
                 <a:effectLst>
                   <a:outerShdw dist="35921" dir="2700000" algn="ctr" rotWithShape="0">
                     <a:schemeClr val="bg2"/>
@@ -6841,14 +6841,14 @@
           <a:effectLst/>
           <a:extLst>
             <a:ext uri="{909E8E84-426E-40dd-AFC4-6F175D3DCCD1}">
-              <a14:hiddenFill xmlns="" xmlns:a14="http://schemas.microsoft.com/office/drawing/2010/main">
+              <a14:hiddenFill xmlns:a14="http://schemas.microsoft.com/office/drawing/2010/main" xmlns="">
                 <a:solidFill>
                   <a:schemeClr val="accent1"/>
                 </a:solidFill>
               </a14:hiddenFill>
             </a:ext>
             <a:ext uri="{91240B29-F687-4f45-9708-019B960494DF}">
-              <a14:hiddenLine xmlns="" xmlns:a14="http://schemas.microsoft.com/office/drawing/2010/main" w="9525">
+              <a14:hiddenLine xmlns:a14="http://schemas.microsoft.com/office/drawing/2010/main" xmlns="" w="9525">
                 <a:solidFill>
                   <a:schemeClr val="tx1"/>
                 </a:solidFill>
@@ -6858,7 +6858,7 @@
               </a14:hiddenLine>
             </a:ext>
             <a:ext uri="{AF507438-7753-43e0-B8FC-AC1667EBCBE1}">
-              <a14:hiddenEffects xmlns="" xmlns:a14="http://schemas.microsoft.com/office/drawing/2010/main">
+              <a14:hiddenEffects xmlns:a14="http://schemas.microsoft.com/office/drawing/2010/main" xmlns="">
                 <a:effectLst>
                   <a:outerShdw dist="35921" dir="2700000" algn="ctr" rotWithShape="0">
                     <a:schemeClr val="bg2"/>
@@ -6911,14 +6911,14 @@
           <a:effectLst/>
           <a:extLst>
             <a:ext uri="{909E8E84-426E-40dd-AFC4-6F175D3DCCD1}">
-              <a14:hiddenFill xmlns="" xmlns:a14="http://schemas.microsoft.com/office/drawing/2010/main">
+              <a14:hiddenFill xmlns:a14="http://schemas.microsoft.com/office/drawing/2010/main" xmlns="">
                 <a:solidFill>
                   <a:schemeClr val="accent1"/>
                 </a:solidFill>
               </a14:hiddenFill>
             </a:ext>
             <a:ext uri="{91240B29-F687-4f45-9708-019B960494DF}">
-              <a14:hiddenLine xmlns="" xmlns:a14="http://schemas.microsoft.com/office/drawing/2010/main" w="9525">
+              <a14:hiddenLine xmlns:a14="http://schemas.microsoft.com/office/drawing/2010/main" xmlns="" w="9525">
                 <a:solidFill>
                   <a:schemeClr val="tx1"/>
                 </a:solidFill>
@@ -6928,7 +6928,7 @@
               </a14:hiddenLine>
             </a:ext>
             <a:ext uri="{AF507438-7753-43e0-B8FC-AC1667EBCBE1}">
-              <a14:hiddenEffects xmlns="" xmlns:a14="http://schemas.microsoft.com/office/drawing/2010/main">
+              <a14:hiddenEffects xmlns:a14="http://schemas.microsoft.com/office/drawing/2010/main" xmlns="">
                 <a:effectLst>
                   <a:outerShdw dist="35921" dir="2700000" algn="ctr" rotWithShape="0">
                     <a:schemeClr val="bg2"/>
@@ -7408,14 +7408,14 @@
           <a:effectLst/>
           <a:extLst>
             <a:ext uri="{909E8E84-426E-40dd-AFC4-6F175D3DCCD1}">
-              <a14:hiddenFill xmlns="" xmlns:a14="http://schemas.microsoft.com/office/drawing/2010/main">
+              <a14:hiddenFill xmlns:a14="http://schemas.microsoft.com/office/drawing/2010/main" xmlns="">
                 <a:solidFill>
                   <a:schemeClr val="accent1"/>
                 </a:solidFill>
               </a14:hiddenFill>
             </a:ext>
             <a:ext uri="{91240B29-F687-4f45-9708-019B960494DF}">
-              <a14:hiddenLine xmlns="" xmlns:a14="http://schemas.microsoft.com/office/drawing/2010/main" w="9525">
+              <a14:hiddenLine xmlns:a14="http://schemas.microsoft.com/office/drawing/2010/main" xmlns="" w="9525">
                 <a:solidFill>
                   <a:schemeClr val="tx1"/>
                 </a:solidFill>
@@ -7425,7 +7425,7 @@
               </a14:hiddenLine>
             </a:ext>
             <a:ext uri="{AF507438-7753-43e0-B8FC-AC1667EBCBE1}">
-              <a14:hiddenEffects xmlns="" xmlns:a14="http://schemas.microsoft.com/office/drawing/2010/main">
+              <a14:hiddenEffects xmlns:a14="http://schemas.microsoft.com/office/drawing/2010/main" xmlns="">
                 <a:effectLst>
                   <a:outerShdw blurRad="63500" dist="38099" dir="2700000" algn="ctr" rotWithShape="0">
                     <a:schemeClr val="bg2">
@@ -7568,14 +7568,14 @@
           <a:effectLst/>
           <a:extLst>
             <a:ext uri="{909E8E84-426E-40dd-AFC4-6F175D3DCCD1}">
-              <a14:hiddenFill xmlns="" xmlns:a14="http://schemas.microsoft.com/office/drawing/2010/main">
+              <a14:hiddenFill xmlns:a14="http://schemas.microsoft.com/office/drawing/2010/main" xmlns="">
                 <a:solidFill>
                   <a:schemeClr val="accent1"/>
                 </a:solidFill>
               </a14:hiddenFill>
             </a:ext>
             <a:ext uri="{91240B29-F687-4f45-9708-019B960494DF}">
-              <a14:hiddenLine xmlns="" xmlns:a14="http://schemas.microsoft.com/office/drawing/2010/main" w="9525">
+              <a14:hiddenLine xmlns:a14="http://schemas.microsoft.com/office/drawing/2010/main" xmlns="" w="9525">
                 <a:solidFill>
                   <a:schemeClr val="tx1"/>
                 </a:solidFill>
@@ -7585,7 +7585,7 @@
               </a14:hiddenLine>
             </a:ext>
             <a:ext uri="{AF507438-7753-43e0-B8FC-AC1667EBCBE1}">
-              <a14:hiddenEffects xmlns="" xmlns:a14="http://schemas.microsoft.com/office/drawing/2010/main">
+              <a14:hiddenEffects xmlns:a14="http://schemas.microsoft.com/office/drawing/2010/main" xmlns="">
                 <a:effectLst>
                   <a:outerShdw blurRad="63500" dist="38099" dir="2700000" algn="ctr" rotWithShape="0">
                     <a:schemeClr val="bg2">
@@ -7890,14 +7890,14 @@
           <a:effectLst/>
           <a:extLst>
             <a:ext uri="{909E8E84-426E-40dd-AFC4-6F175D3DCCD1}">
-              <a14:hiddenFill xmlns="" xmlns:a14="http://schemas.microsoft.com/office/drawing/2010/main">
+              <a14:hiddenFill xmlns:a14="http://schemas.microsoft.com/office/drawing/2010/main" xmlns="">
                 <a:solidFill>
                   <a:schemeClr val="accent1"/>
                 </a:solidFill>
               </a14:hiddenFill>
             </a:ext>
             <a:ext uri="{91240B29-F687-4f45-9708-019B960494DF}">
-              <a14:hiddenLine xmlns="" xmlns:a14="http://schemas.microsoft.com/office/drawing/2010/main" w="9525">
+              <a14:hiddenLine xmlns:a14="http://schemas.microsoft.com/office/drawing/2010/main" xmlns="" w="9525">
                 <a:solidFill>
                   <a:schemeClr val="tx1"/>
                 </a:solidFill>
@@ -7907,7 +7907,7 @@
               </a14:hiddenLine>
             </a:ext>
             <a:ext uri="{AF507438-7753-43e0-B8FC-AC1667EBCBE1}">
-              <a14:hiddenEffects xmlns="" xmlns:a14="http://schemas.microsoft.com/office/drawing/2010/main">
+              <a14:hiddenEffects xmlns:a14="http://schemas.microsoft.com/office/drawing/2010/main" xmlns="">
                 <a:effectLst>
                   <a:outerShdw blurRad="63500" dist="38099" dir="2700000" algn="ctr" rotWithShape="0">
                     <a:schemeClr val="bg2">
@@ -8099,14 +8099,14 @@
           <a:effectLst/>
           <a:extLst>
             <a:ext uri="{909E8E84-426E-40dd-AFC4-6F175D3DCCD1}">
-              <a14:hiddenFill xmlns="" xmlns:a14="http://schemas.microsoft.com/office/drawing/2010/main">
+              <a14:hiddenFill xmlns:a14="http://schemas.microsoft.com/office/drawing/2010/main" xmlns="">
                 <a:solidFill>
                   <a:schemeClr val="accent1"/>
                 </a:solidFill>
               </a14:hiddenFill>
             </a:ext>
             <a:ext uri="{91240B29-F687-4f45-9708-019B960494DF}">
-              <a14:hiddenLine xmlns="" xmlns:a14="http://schemas.microsoft.com/office/drawing/2010/main" w="9525">
+              <a14:hiddenLine xmlns:a14="http://schemas.microsoft.com/office/drawing/2010/main" xmlns="" w="9525">
                 <a:solidFill>
                   <a:schemeClr val="tx1"/>
                 </a:solidFill>
@@ -8116,7 +8116,7 @@
               </a14:hiddenLine>
             </a:ext>
             <a:ext uri="{AF507438-7753-43e0-B8FC-AC1667EBCBE1}">
-              <a14:hiddenEffects xmlns="" xmlns:a14="http://schemas.microsoft.com/office/drawing/2010/main">
+              <a14:hiddenEffects xmlns:a14="http://schemas.microsoft.com/office/drawing/2010/main" xmlns="">
                 <a:effectLst>
                   <a:outerShdw blurRad="63500" dist="38099" dir="2700000" algn="ctr" rotWithShape="0">
                     <a:schemeClr val="bg2">
@@ -8949,14 +8949,14 @@
           <a:effectLst/>
           <a:extLst>
             <a:ext uri="{909E8E84-426E-40dd-AFC4-6F175D3DCCD1}">
-              <a14:hiddenFill xmlns="" xmlns:a14="http://schemas.microsoft.com/office/drawing/2010/main">
+              <a14:hiddenFill xmlns:a14="http://schemas.microsoft.com/office/drawing/2010/main" xmlns="">
                 <a:solidFill>
                   <a:schemeClr val="accent1"/>
                 </a:solidFill>
               </a14:hiddenFill>
             </a:ext>
             <a:ext uri="{91240B29-F687-4f45-9708-019B960494DF}">
-              <a14:hiddenLine xmlns="" xmlns:a14="http://schemas.microsoft.com/office/drawing/2010/main" w="9525">
+              <a14:hiddenLine xmlns:a14="http://schemas.microsoft.com/office/drawing/2010/main" xmlns="" w="9525">
                 <a:solidFill>
                   <a:schemeClr val="tx1"/>
                 </a:solidFill>
@@ -8966,7 +8966,7 @@
               </a14:hiddenLine>
             </a:ext>
             <a:ext uri="{AF507438-7753-43e0-B8FC-AC1667EBCBE1}">
-              <a14:hiddenEffects xmlns="" xmlns:a14="http://schemas.microsoft.com/office/drawing/2010/main">
+              <a14:hiddenEffects xmlns:a14="http://schemas.microsoft.com/office/drawing/2010/main" xmlns="">
                 <a:effectLst>
                   <a:outerShdw blurRad="63500" dist="38099" dir="2700000" algn="ctr" rotWithShape="0">
                     <a:schemeClr val="bg2">
@@ -9823,14 +9823,14 @@
           <a:effectLst/>
           <a:extLst>
             <a:ext uri="{909E8E84-426E-40dd-AFC4-6F175D3DCCD1}">
-              <a14:hiddenFill xmlns="" xmlns:a14="http://schemas.microsoft.com/office/drawing/2010/main">
+              <a14:hiddenFill xmlns:a14="http://schemas.microsoft.com/office/drawing/2010/main" xmlns="">
                 <a:solidFill>
                   <a:schemeClr val="accent1"/>
                 </a:solidFill>
               </a14:hiddenFill>
             </a:ext>
             <a:ext uri="{91240B29-F687-4f45-9708-019B960494DF}">
-              <a14:hiddenLine xmlns="" xmlns:a14="http://schemas.microsoft.com/office/drawing/2010/main" w="9525">
+              <a14:hiddenLine xmlns:a14="http://schemas.microsoft.com/office/drawing/2010/main" xmlns="" w="9525">
                 <a:solidFill>
                   <a:schemeClr val="tx1"/>
                 </a:solidFill>
@@ -9840,7 +9840,7 @@
               </a14:hiddenLine>
             </a:ext>
             <a:ext uri="{AF507438-7753-43e0-B8FC-AC1667EBCBE1}">
-              <a14:hiddenEffects xmlns="" xmlns:a14="http://schemas.microsoft.com/office/drawing/2010/main">
+              <a14:hiddenEffects xmlns:a14="http://schemas.microsoft.com/office/drawing/2010/main" xmlns="">
                 <a:effectLst>
                   <a:outerShdw blurRad="63500" dist="38099" dir="2700000" algn="ctr" rotWithShape="0">
                     <a:schemeClr val="bg2">
@@ -10706,14 +10706,14 @@
           <a:effectLst/>
           <a:extLst>
             <a:ext uri="{909E8E84-426E-40dd-AFC4-6F175D3DCCD1}">
-              <a14:hiddenFill xmlns="" xmlns:a14="http://schemas.microsoft.com/office/drawing/2010/main">
+              <a14:hiddenFill xmlns:a14="http://schemas.microsoft.com/office/drawing/2010/main" xmlns="">
                 <a:solidFill>
                   <a:schemeClr val="accent1"/>
                 </a:solidFill>
               </a14:hiddenFill>
             </a:ext>
             <a:ext uri="{91240B29-F687-4f45-9708-019B960494DF}">
-              <a14:hiddenLine xmlns="" xmlns:a14="http://schemas.microsoft.com/office/drawing/2010/main" w="9525">
+              <a14:hiddenLine xmlns:a14="http://schemas.microsoft.com/office/drawing/2010/main" xmlns="" w="9525">
                 <a:solidFill>
                   <a:schemeClr val="tx1"/>
                 </a:solidFill>
@@ -10723,7 +10723,7 @@
               </a14:hiddenLine>
             </a:ext>
             <a:ext uri="{AF507438-7753-43e0-B8FC-AC1667EBCBE1}">
-              <a14:hiddenEffects xmlns="" xmlns:a14="http://schemas.microsoft.com/office/drawing/2010/main">
+              <a14:hiddenEffects xmlns:a14="http://schemas.microsoft.com/office/drawing/2010/main" xmlns="">
                 <a:effectLst>
                   <a:outerShdw blurRad="63500" dist="38099" dir="2700000" algn="ctr" rotWithShape="0">
                     <a:schemeClr val="bg2">
@@ -11087,6 +11087,82 @@
               <a:rPr lang="en-US" dirty="0"/>
               <a:t> repo and was able to submit a issue which was fixed and closed. </a:t>
             </a:r>
+          </a:p>
+        </p:txBody>
+      </p:sp>
+      <p:sp>
+        <p:nvSpPr>
+          <p:cNvPr id="3" name="TextBox 2">
+            <a:extLst>
+              <a:ext uri="{FF2B5EF4-FFF2-40B4-BE49-F238E27FC236}">
+                <a16:creationId xmlns:a16="http://schemas.microsoft.com/office/drawing/2014/main" id="{5BBED6A5-0811-B84F-8663-180B4C406BD1}"/>
+              </a:ext>
+            </a:extLst>
+          </p:cNvPr>
+          <p:cNvSpPr txBox="1"/>
+          <p:nvPr/>
+        </p:nvSpPr>
+        <p:spPr>
+          <a:xfrm>
+            <a:off x="1447800" y="5340383"/>
+            <a:ext cx="6596678" cy="646331"/>
+          </a:xfrm>
+          <a:prstGeom prst="rect">
+            <a:avLst/>
+          </a:prstGeom>
+          <a:noFill/>
+        </p:spPr>
+        <p:txBody>
+          <a:bodyPr wrap="none" rtlCol="0">
+            <a:spAutoFit/>
+          </a:bodyPr>
+          <a:lstStyle/>
+          <a:p>
+            <a:pPr algn="ctr"/>
+            <a:r>
+              <a:rPr lang="en-US" dirty="0"/>
+              <a:t>Here is a link to my review of the code:</a:t>
+            </a:r>
+            <a:br>
+              <a:rPr lang="en-US" dirty="0"/>
+            </a:br>
+            <a:r>
+              <a:rPr lang="en-US" dirty="0">
+                <a:hlinkClick r:id="rId4"/>
+              </a:rPr>
+              <a:t>https://</a:t>
+            </a:r>
+            <a:r>
+              <a:rPr lang="en-US" dirty="0" err="1">
+                <a:hlinkClick r:id="rId4"/>
+              </a:rPr>
+              <a:t>github.com</a:t>
+            </a:r>
+            <a:r>
+              <a:rPr lang="en-US" dirty="0">
+                <a:hlinkClick r:id="rId4"/>
+              </a:rPr>
+              <a:t>/</a:t>
+            </a:r>
+            <a:r>
+              <a:rPr lang="en-US" dirty="0" err="1">
+                <a:hlinkClick r:id="rId4"/>
+              </a:rPr>
+              <a:t>hildebrandt</a:t>
+            </a:r>
+            <a:r>
+              <a:rPr lang="en-US" dirty="0">
+                <a:hlinkClick r:id="rId4"/>
+              </a:rPr>
+              <a:t>-carl/</a:t>
+            </a:r>
+            <a:r>
+              <a:rPr lang="en-US" dirty="0" err="1">
+                <a:hlinkClick r:id="rId4"/>
+              </a:rPr>
+              <a:t>SafeReinforcementLearning</a:t>
+            </a:r>
+            <a:endParaRPr lang="en-US" dirty="0"/>
           </a:p>
         </p:txBody>
       </p:sp>
@@ -11143,14 +11219,14 @@
           <a:effectLst/>
           <a:extLst>
             <a:ext uri="{909E8E84-426E-40dd-AFC4-6F175D3DCCD1}">
-              <a14:hiddenFill xmlns="" xmlns:a14="http://schemas.microsoft.com/office/drawing/2010/main">
+              <a14:hiddenFill xmlns:a14="http://schemas.microsoft.com/office/drawing/2010/main" xmlns="">
                 <a:solidFill>
                   <a:schemeClr val="accent1"/>
                 </a:solidFill>
               </a14:hiddenFill>
             </a:ext>
             <a:ext uri="{91240B29-F687-4f45-9708-019B960494DF}">
-              <a14:hiddenLine xmlns="" xmlns:a14="http://schemas.microsoft.com/office/drawing/2010/main" w="9525">
+              <a14:hiddenLine xmlns:a14="http://schemas.microsoft.com/office/drawing/2010/main" xmlns="" w="9525">
                 <a:solidFill>
                   <a:schemeClr val="tx1"/>
                 </a:solidFill>
@@ -11160,7 +11236,7 @@
               </a14:hiddenLine>
             </a:ext>
             <a:ext uri="{AF507438-7753-43e0-B8FC-AC1667EBCBE1}">
-              <a14:hiddenEffects xmlns="" xmlns:a14="http://schemas.microsoft.com/office/drawing/2010/main">
+              <a14:hiddenEffects xmlns:a14="http://schemas.microsoft.com/office/drawing/2010/main" xmlns="">
                 <a:effectLst>
                   <a:outerShdw blurRad="63500" dist="38099" dir="2700000" algn="ctr" rotWithShape="0">
                     <a:schemeClr val="bg2">
@@ -11520,14 +11596,14 @@
           <a:effectLst/>
           <a:extLst>
             <a:ext uri="{909E8E84-426E-40dd-AFC4-6F175D3DCCD1}">
-              <a14:hiddenFill xmlns="" xmlns:a14="http://schemas.microsoft.com/office/drawing/2010/main">
+              <a14:hiddenFill xmlns:a14="http://schemas.microsoft.com/office/drawing/2010/main" xmlns="">
                 <a:solidFill>
                   <a:schemeClr val="accent1"/>
                 </a:solidFill>
               </a14:hiddenFill>
             </a:ext>
             <a:ext uri="{91240B29-F687-4f45-9708-019B960494DF}">
-              <a14:hiddenLine xmlns="" xmlns:a14="http://schemas.microsoft.com/office/drawing/2010/main" w="9525">
+              <a14:hiddenLine xmlns:a14="http://schemas.microsoft.com/office/drawing/2010/main" xmlns="" w="9525">
                 <a:solidFill>
                   <a:schemeClr val="tx1"/>
                 </a:solidFill>
@@ -11537,7 +11613,7 @@
               </a14:hiddenLine>
             </a:ext>
             <a:ext uri="{AF507438-7753-43e0-B8FC-AC1667EBCBE1}">
-              <a14:hiddenEffects xmlns="" xmlns:a14="http://schemas.microsoft.com/office/drawing/2010/main">
+              <a14:hiddenEffects xmlns:a14="http://schemas.microsoft.com/office/drawing/2010/main" xmlns="">
                 <a:effectLst>
                   <a:outerShdw blurRad="63500" dist="38099" dir="2700000" algn="ctr" rotWithShape="0">
                     <a:schemeClr val="bg2">
@@ -11592,14 +11668,14 @@
           </a:ln>
           <a:extLst>
             <a:ext uri="{909E8E84-426E-40dd-AFC4-6F175D3DCCD1}">
-              <a14:hiddenFill xmlns="" xmlns:a14="http://schemas.microsoft.com/office/drawing/2010/main">
+              <a14:hiddenFill xmlns:a14="http://schemas.microsoft.com/office/drawing/2010/main" xmlns="">
                 <a:solidFill>
                   <a:srgbClr val="FFFFFF"/>
                 </a:solidFill>
               </a14:hiddenFill>
             </a:ext>
             <a:ext uri="{91240B29-F687-4f45-9708-019B960494DF}">
-              <a14:hiddenLine xmlns="" xmlns:a14="http://schemas.microsoft.com/office/drawing/2010/main" w="9525">
+              <a14:hiddenLine xmlns:a14="http://schemas.microsoft.com/office/drawing/2010/main" xmlns="" w="9525">
                 <a:solidFill>
                   <a:srgbClr val="000000"/>
                 </a:solidFill>
@@ -11930,14 +12006,14 @@
           <a:effectLst/>
           <a:extLst>
             <a:ext uri="{909E8E84-426E-40dd-AFC4-6F175D3DCCD1}">
-              <a14:hiddenFill xmlns="" xmlns:a14="http://schemas.microsoft.com/office/drawing/2010/main">
+              <a14:hiddenFill xmlns:a14="http://schemas.microsoft.com/office/drawing/2010/main" xmlns="">
                 <a:solidFill>
                   <a:schemeClr val="accent1"/>
                 </a:solidFill>
               </a14:hiddenFill>
             </a:ext>
             <a:ext uri="{91240B29-F687-4f45-9708-019B960494DF}">
-              <a14:hiddenLine xmlns="" xmlns:a14="http://schemas.microsoft.com/office/drawing/2010/main" w="9525">
+              <a14:hiddenLine xmlns:a14="http://schemas.microsoft.com/office/drawing/2010/main" xmlns="" w="9525">
                 <a:solidFill>
                   <a:schemeClr val="tx1"/>
                 </a:solidFill>
@@ -11947,7 +12023,7 @@
               </a14:hiddenLine>
             </a:ext>
             <a:ext uri="{AF507438-7753-43e0-B8FC-AC1667EBCBE1}">
-              <a14:hiddenEffects xmlns="" xmlns:a14="http://schemas.microsoft.com/office/drawing/2010/main">
+              <a14:hiddenEffects xmlns:a14="http://schemas.microsoft.com/office/drawing/2010/main" xmlns="">
                 <a:effectLst>
                   <a:outerShdw blurRad="63500" dist="38099" dir="2700000" algn="ctr" rotWithShape="0">
                     <a:schemeClr val="bg2">
@@ -12002,14 +12078,14 @@
           </a:ln>
           <a:extLst>
             <a:ext uri="{909E8E84-426E-40dd-AFC4-6F175D3DCCD1}">
-              <a14:hiddenFill xmlns="" xmlns:a14="http://schemas.microsoft.com/office/drawing/2010/main">
+              <a14:hiddenFill xmlns:a14="http://schemas.microsoft.com/office/drawing/2010/main" xmlns="">
                 <a:solidFill>
                   <a:srgbClr val="FFFFFF"/>
                 </a:solidFill>
               </a14:hiddenFill>
             </a:ext>
             <a:ext uri="{91240B29-F687-4f45-9708-019B960494DF}">
-              <a14:hiddenLine xmlns="" xmlns:a14="http://schemas.microsoft.com/office/drawing/2010/main" w="9525">
+              <a14:hiddenLine xmlns:a14="http://schemas.microsoft.com/office/drawing/2010/main" xmlns="" w="9525">
                 <a:solidFill>
                   <a:srgbClr val="000000"/>
                 </a:solidFill>
@@ -12808,14 +12884,14 @@
           <a:effectLst/>
           <a:extLst>
             <a:ext uri="{909E8E84-426E-40dd-AFC4-6F175D3DCCD1}">
-              <a14:hiddenFill xmlns="" xmlns:a14="http://schemas.microsoft.com/office/drawing/2010/main">
+              <a14:hiddenFill xmlns:a14="http://schemas.microsoft.com/office/drawing/2010/main" xmlns="">
                 <a:solidFill>
                   <a:schemeClr val="accent1"/>
                 </a:solidFill>
               </a14:hiddenFill>
             </a:ext>
             <a:ext uri="{91240B29-F687-4f45-9708-019B960494DF}">
-              <a14:hiddenLine xmlns="" xmlns:a14="http://schemas.microsoft.com/office/drawing/2010/main" w="9525">
+              <a14:hiddenLine xmlns:a14="http://schemas.microsoft.com/office/drawing/2010/main" xmlns="" w="9525">
                 <a:solidFill>
                   <a:schemeClr val="tx1"/>
                 </a:solidFill>
@@ -12825,7 +12901,7 @@
               </a14:hiddenLine>
             </a:ext>
             <a:ext uri="{AF507438-7753-43e0-B8FC-AC1667EBCBE1}">
-              <a14:hiddenEffects xmlns="" xmlns:a14="http://schemas.microsoft.com/office/drawing/2010/main">
+              <a14:hiddenEffects xmlns:a14="http://schemas.microsoft.com/office/drawing/2010/main" xmlns="">
                 <a:effectLst>
                   <a:outerShdw blurRad="63500" dist="38099" dir="2700000" algn="ctr" rotWithShape="0">
                     <a:schemeClr val="bg2">
@@ -13535,14 +13611,14 @@
           <a:effectLst/>
           <a:extLst>
             <a:ext uri="{909E8E84-426E-40dd-AFC4-6F175D3DCCD1}">
-              <a14:hiddenFill xmlns="" xmlns:a14="http://schemas.microsoft.com/office/drawing/2010/main">
+              <a14:hiddenFill xmlns:a14="http://schemas.microsoft.com/office/drawing/2010/main" xmlns="">
                 <a:solidFill>
                   <a:schemeClr val="accent1"/>
                 </a:solidFill>
               </a14:hiddenFill>
             </a:ext>
             <a:ext uri="{91240B29-F687-4f45-9708-019B960494DF}">
-              <a14:hiddenLine xmlns="" xmlns:a14="http://schemas.microsoft.com/office/drawing/2010/main" w="9525">
+              <a14:hiddenLine xmlns:a14="http://schemas.microsoft.com/office/drawing/2010/main" xmlns="" w="9525">
                 <a:solidFill>
                   <a:schemeClr val="tx1"/>
                 </a:solidFill>
@@ -13552,7 +13628,7 @@
               </a14:hiddenLine>
             </a:ext>
             <a:ext uri="{AF507438-7753-43e0-B8FC-AC1667EBCBE1}">
-              <a14:hiddenEffects xmlns="" xmlns:a14="http://schemas.microsoft.com/office/drawing/2010/main">
+              <a14:hiddenEffects xmlns:a14="http://schemas.microsoft.com/office/drawing/2010/main" xmlns="">
                 <a:effectLst>
                   <a:outerShdw blurRad="63500" dist="38099" dir="2700000" algn="ctr" rotWithShape="0">
                     <a:schemeClr val="bg2">
@@ -14240,14 +14316,14 @@
           <a:effectLst/>
           <a:extLst>
             <a:ext uri="{909E8E84-426E-40dd-AFC4-6F175D3DCCD1}">
-              <a14:hiddenFill xmlns="" xmlns:a14="http://schemas.microsoft.com/office/drawing/2010/main">
+              <a14:hiddenFill xmlns:a14="http://schemas.microsoft.com/office/drawing/2010/main" xmlns="">
                 <a:solidFill>
                   <a:schemeClr val="accent1"/>
                 </a:solidFill>
               </a14:hiddenFill>
             </a:ext>
             <a:ext uri="{91240B29-F687-4f45-9708-019B960494DF}">
-              <a14:hiddenLine xmlns="" xmlns:a14="http://schemas.microsoft.com/office/drawing/2010/main" w="9525">
+              <a14:hiddenLine xmlns:a14="http://schemas.microsoft.com/office/drawing/2010/main" xmlns="" w="9525">
                 <a:solidFill>
                   <a:schemeClr val="tx1"/>
                 </a:solidFill>
@@ -14257,7 +14333,7 @@
               </a14:hiddenLine>
             </a:ext>
             <a:ext uri="{AF507438-7753-43e0-B8FC-AC1667EBCBE1}">
-              <a14:hiddenEffects xmlns="" xmlns:a14="http://schemas.microsoft.com/office/drawing/2010/main">
+              <a14:hiddenEffects xmlns:a14="http://schemas.microsoft.com/office/drawing/2010/main" xmlns="">
                 <a:effectLst>
                   <a:outerShdw blurRad="63500" dist="38099" dir="2700000" algn="ctr" rotWithShape="0">
                     <a:schemeClr val="bg2">
@@ -14779,14 +14855,14 @@
           <a:effectLst/>
           <a:extLst>
             <a:ext uri="{909E8E84-426E-40dd-AFC4-6F175D3DCCD1}">
-              <a14:hiddenFill xmlns="" xmlns:a14="http://schemas.microsoft.com/office/drawing/2010/main">
+              <a14:hiddenFill xmlns:a14="http://schemas.microsoft.com/office/drawing/2010/main" xmlns="">
                 <a:solidFill>
                   <a:schemeClr val="accent1"/>
                 </a:solidFill>
               </a14:hiddenFill>
             </a:ext>
             <a:ext uri="{91240B29-F687-4f45-9708-019B960494DF}">
-              <a14:hiddenLine xmlns="" xmlns:a14="http://schemas.microsoft.com/office/drawing/2010/main" w="9525">
+              <a14:hiddenLine xmlns:a14="http://schemas.microsoft.com/office/drawing/2010/main" xmlns="" w="9525">
                 <a:solidFill>
                   <a:schemeClr val="tx1"/>
                 </a:solidFill>
@@ -14796,7 +14872,7 @@
               </a14:hiddenLine>
             </a:ext>
             <a:ext uri="{AF507438-7753-43e0-B8FC-AC1667EBCBE1}">
-              <a14:hiddenEffects xmlns="" xmlns:a14="http://schemas.microsoft.com/office/drawing/2010/main">
+              <a14:hiddenEffects xmlns:a14="http://schemas.microsoft.com/office/drawing/2010/main" xmlns="">
                 <a:effectLst>
                   <a:outerShdw blurRad="63500" dist="38099" dir="2700000" algn="ctr" rotWithShape="0">
                     <a:schemeClr val="bg2">
@@ -15528,14 +15604,14 @@
           <a:effectLst/>
           <a:extLst>
             <a:ext uri="{909E8E84-426E-40dd-AFC4-6F175D3DCCD1}">
-              <a14:hiddenFill xmlns="" xmlns:a14="http://schemas.microsoft.com/office/drawing/2010/main">
+              <a14:hiddenFill xmlns:a14="http://schemas.microsoft.com/office/drawing/2010/main" xmlns="">
                 <a:solidFill>
                   <a:schemeClr val="accent1"/>
                 </a:solidFill>
               </a14:hiddenFill>
             </a:ext>
             <a:ext uri="{91240B29-F687-4f45-9708-019B960494DF}">
-              <a14:hiddenLine xmlns="" xmlns:a14="http://schemas.microsoft.com/office/drawing/2010/main" w="9525">
+              <a14:hiddenLine xmlns:a14="http://schemas.microsoft.com/office/drawing/2010/main" xmlns="" w="9525">
                 <a:solidFill>
                   <a:schemeClr val="tx1"/>
                 </a:solidFill>
@@ -15545,7 +15621,7 @@
               </a14:hiddenLine>
             </a:ext>
             <a:ext uri="{AF507438-7753-43e0-B8FC-AC1667EBCBE1}">
-              <a14:hiddenEffects xmlns="" xmlns:a14="http://schemas.microsoft.com/office/drawing/2010/main">
+              <a14:hiddenEffects xmlns:a14="http://schemas.microsoft.com/office/drawing/2010/main" xmlns="">
                 <a:effectLst>
                   <a:outerShdw blurRad="63500" dist="38099" dir="2700000" algn="ctr" rotWithShape="0">
                     <a:schemeClr val="bg2">
@@ -15983,14 +16059,14 @@
           <a:effectLst/>
           <a:extLst>
             <a:ext uri="{909E8E84-426E-40dd-AFC4-6F175D3DCCD1}">
-              <a14:hiddenFill xmlns="" xmlns:a14="http://schemas.microsoft.com/office/drawing/2010/main">
+              <a14:hiddenFill xmlns:a14="http://schemas.microsoft.com/office/drawing/2010/main" xmlns="">
                 <a:solidFill>
                   <a:schemeClr val="accent1"/>
                 </a:solidFill>
               </a14:hiddenFill>
             </a:ext>
             <a:ext uri="{91240B29-F687-4f45-9708-019B960494DF}">
-              <a14:hiddenLine xmlns="" xmlns:a14="http://schemas.microsoft.com/office/drawing/2010/main" w="9525">
+              <a14:hiddenLine xmlns:a14="http://schemas.microsoft.com/office/drawing/2010/main" xmlns="" w="9525">
                 <a:solidFill>
                   <a:schemeClr val="tx1"/>
                 </a:solidFill>
@@ -16000,7 +16076,7 @@
               </a14:hiddenLine>
             </a:ext>
             <a:ext uri="{AF507438-7753-43e0-B8FC-AC1667EBCBE1}">
-              <a14:hiddenEffects xmlns="" xmlns:a14="http://schemas.microsoft.com/office/drawing/2010/main">
+              <a14:hiddenEffects xmlns:a14="http://schemas.microsoft.com/office/drawing/2010/main" xmlns="">
                 <a:effectLst>
                   <a:outerShdw blurRad="63500" dist="38099" dir="2700000" algn="ctr" rotWithShape="0">
                     <a:schemeClr val="bg2">
@@ -16162,7 +16238,7 @@
           <a:noFill/>
           <a:extLst>
             <a:ext uri="{909E8E84-426E-40dd-AFC4-6F175D3DCCD1}">
-              <a14:hiddenFill xmlns="" xmlns:a14="http://schemas.microsoft.com/office/drawing/2010/main">
+              <a14:hiddenFill xmlns:a14="http://schemas.microsoft.com/office/drawing/2010/main" xmlns="">
                 <a:solidFill>
                   <a:srgbClr val="FFFFFF"/>
                 </a:solidFill>
@@ -16201,7 +16277,7 @@
           <a:noFill/>
           <a:extLst>
             <a:ext uri="{909E8E84-426E-40dd-AFC4-6F175D3DCCD1}">
-              <a14:hiddenFill xmlns="" xmlns:a14="http://schemas.microsoft.com/office/drawing/2010/main">
+              <a14:hiddenFill xmlns:a14="http://schemas.microsoft.com/office/drawing/2010/main" xmlns="">
                 <a:solidFill>
                   <a:srgbClr val="FFFFFF"/>
                 </a:solidFill>
@@ -16374,14 +16450,14 @@
           <a:effectLst/>
           <a:extLst>
             <a:ext uri="{909E8E84-426E-40dd-AFC4-6F175D3DCCD1}">
-              <a14:hiddenFill xmlns="" xmlns:a14="http://schemas.microsoft.com/office/drawing/2010/main">
+              <a14:hiddenFill xmlns:a14="http://schemas.microsoft.com/office/drawing/2010/main" xmlns="">
                 <a:solidFill>
                   <a:schemeClr val="accent1"/>
                 </a:solidFill>
               </a14:hiddenFill>
             </a:ext>
             <a:ext uri="{91240B29-F687-4f45-9708-019B960494DF}">
-              <a14:hiddenLine xmlns="" xmlns:a14="http://schemas.microsoft.com/office/drawing/2010/main" w="9525">
+              <a14:hiddenLine xmlns:a14="http://schemas.microsoft.com/office/drawing/2010/main" xmlns="" w="9525">
                 <a:solidFill>
                   <a:schemeClr val="tx1"/>
                 </a:solidFill>
@@ -16391,7 +16467,7 @@
               </a14:hiddenLine>
             </a:ext>
             <a:ext uri="{AF507438-7753-43e0-B8FC-AC1667EBCBE1}">
-              <a14:hiddenEffects xmlns="" xmlns:a14="http://schemas.microsoft.com/office/drawing/2010/main">
+              <a14:hiddenEffects xmlns:a14="http://schemas.microsoft.com/office/drawing/2010/main" xmlns="">
                 <a:effectLst>
                   <a:outerShdw blurRad="63500" dist="38099" dir="2700000" algn="ctr" rotWithShape="0">
                     <a:schemeClr val="bg2">
@@ -16910,14 +16986,14 @@
           <a:effectLst/>
           <a:extLst>
             <a:ext uri="{909E8E84-426E-40dd-AFC4-6F175D3DCCD1}">
-              <a14:hiddenFill xmlns="" xmlns:a14="http://schemas.microsoft.com/office/drawing/2010/main">
+              <a14:hiddenFill xmlns:a14="http://schemas.microsoft.com/office/drawing/2010/main" xmlns="">
                 <a:solidFill>
                   <a:schemeClr val="accent1"/>
                 </a:solidFill>
               </a14:hiddenFill>
             </a:ext>
             <a:ext uri="{91240B29-F687-4f45-9708-019B960494DF}">
-              <a14:hiddenLine xmlns="" xmlns:a14="http://schemas.microsoft.com/office/drawing/2010/main" w="9525">
+              <a14:hiddenLine xmlns:a14="http://schemas.microsoft.com/office/drawing/2010/main" xmlns="" w="9525">
                 <a:solidFill>
                   <a:schemeClr val="tx1"/>
                 </a:solidFill>
@@ -16927,7 +17003,7 @@
               </a14:hiddenLine>
             </a:ext>
             <a:ext uri="{AF507438-7753-43e0-B8FC-AC1667EBCBE1}">
-              <a14:hiddenEffects xmlns="" xmlns:a14="http://schemas.microsoft.com/office/drawing/2010/main">
+              <a14:hiddenEffects xmlns:a14="http://schemas.microsoft.com/office/drawing/2010/main" xmlns="">
                 <a:effectLst>
                   <a:outerShdw blurRad="63500" dist="38099" dir="2700000" algn="ctr" rotWithShape="0">
                     <a:schemeClr val="bg2">

</xml_diff>

<commit_message>
Updated slides and added pdf version of the PDF
</commit_message>
<xml_diff>
--- a/vnow-PresentationTemplate.pptx
+++ b/vnow-PresentationTemplate.pptx
@@ -389,14 +389,14 @@
           <a:effectLst/>
           <a:extLst>
             <a:ext uri="{909E8E84-426E-40dd-AFC4-6F175D3DCCD1}">
-              <a14:hiddenFill xmlns:a14="http://schemas.microsoft.com/office/drawing/2010/main" xmlns="">
+              <a14:hiddenFill xmlns="" xmlns:a14="http://schemas.microsoft.com/office/drawing/2010/main">
                 <a:solidFill>
                   <a:schemeClr val="accent1"/>
                 </a:solidFill>
               </a14:hiddenFill>
             </a:ext>
             <a:ext uri="{91240B29-F687-4f45-9708-019B960494DF}">
-              <a14:hiddenLine xmlns:a14="http://schemas.microsoft.com/office/drawing/2010/main" xmlns="" w="9525">
+              <a14:hiddenLine xmlns="" xmlns:a14="http://schemas.microsoft.com/office/drawing/2010/main" w="9525">
                 <a:solidFill>
                   <a:schemeClr val="tx1"/>
                 </a:solidFill>
@@ -406,7 +406,7 @@
               </a14:hiddenLine>
             </a:ext>
             <a:ext uri="{AF507438-7753-43e0-B8FC-AC1667EBCBE1}">
-              <a14:hiddenEffects xmlns:a14="http://schemas.microsoft.com/office/drawing/2010/main" xmlns="">
+              <a14:hiddenEffects xmlns="" xmlns:a14="http://schemas.microsoft.com/office/drawing/2010/main">
                 <a:effectLst>
                   <a:outerShdw dist="35921" dir="2700000" algn="ctr" rotWithShape="0">
                     <a:schemeClr val="bg2"/>
@@ -459,14 +459,14 @@
           <a:effectLst/>
           <a:extLst>
             <a:ext uri="{909E8E84-426E-40dd-AFC4-6F175D3DCCD1}">
-              <a14:hiddenFill xmlns:a14="http://schemas.microsoft.com/office/drawing/2010/main" xmlns="">
+              <a14:hiddenFill xmlns="" xmlns:a14="http://schemas.microsoft.com/office/drawing/2010/main">
                 <a:solidFill>
                   <a:schemeClr val="accent1"/>
                 </a:solidFill>
               </a14:hiddenFill>
             </a:ext>
             <a:ext uri="{91240B29-F687-4f45-9708-019B960494DF}">
-              <a14:hiddenLine xmlns:a14="http://schemas.microsoft.com/office/drawing/2010/main" xmlns="" w="9525">
+              <a14:hiddenLine xmlns="" xmlns:a14="http://schemas.microsoft.com/office/drawing/2010/main" w="9525">
                 <a:solidFill>
                   <a:schemeClr val="tx1"/>
                 </a:solidFill>
@@ -476,7 +476,7 @@
               </a14:hiddenLine>
             </a:ext>
             <a:ext uri="{AF507438-7753-43e0-B8FC-AC1667EBCBE1}">
-              <a14:hiddenEffects xmlns:a14="http://schemas.microsoft.com/office/drawing/2010/main" xmlns="">
+              <a14:hiddenEffects xmlns="" xmlns:a14="http://schemas.microsoft.com/office/drawing/2010/main">
                 <a:effectLst>
                   <a:outerShdw dist="35921" dir="2700000" algn="ctr" rotWithShape="0">
                     <a:schemeClr val="bg2"/>
@@ -534,17 +534,17 @@
           <a:effectLst/>
           <a:extLst>
             <a:ext uri="{FAA26D3D-D897-4be2-8F04-BA451C77F1D7}">
-              <ma14:placeholderFlag xmlns:ma14="http://schemas.microsoft.com/office/mac/drawingml/2011/main" xmlns="" val="1"/>
+              <ma14:placeholderFlag xmlns="" xmlns:ma14="http://schemas.microsoft.com/office/mac/drawingml/2011/main" val="1"/>
             </a:ext>
             <a:ext uri="{909E8E84-426E-40dd-AFC4-6F175D3DCCD1}">
-              <a14:hiddenFill xmlns:a14="http://schemas.microsoft.com/office/drawing/2010/main" xmlns="">
+              <a14:hiddenFill xmlns="" xmlns:a14="http://schemas.microsoft.com/office/drawing/2010/main">
                 <a:solidFill>
                   <a:srgbClr val="FFFFFF"/>
                 </a:solidFill>
               </a14:hiddenFill>
             </a:ext>
             <a:ext uri="{AF507438-7753-43e0-B8FC-AC1667EBCBE1}">
-              <a14:hiddenEffects xmlns:a14="http://schemas.microsoft.com/office/drawing/2010/main" xmlns="">
+              <a14:hiddenEffects xmlns="" xmlns:a14="http://schemas.microsoft.com/office/drawing/2010/main">
                 <a:effectLst>
                   <a:outerShdw blurRad="63500" dist="38099" dir="2700000" algn="ctr" rotWithShape="0">
                     <a:srgbClr val="000000">
@@ -555,7 +555,7 @@
               </a14:hiddenEffects>
             </a:ext>
             <a:ext uri="{53640926-AAD7-44d8-BBD7-CCE9431645EC}">
-              <a14:shadowObscured xmlns:a14="http://schemas.microsoft.com/office/drawing/2010/main" xmlns="" val="1"/>
+              <a14:shadowObscured xmlns="" xmlns:a14="http://schemas.microsoft.com/office/drawing/2010/main" val="1"/>
             </a:ext>
           </a:extLst>
         </p:spPr>
@@ -585,14 +585,14 @@
           <a:effectLst/>
           <a:extLst>
             <a:ext uri="{909E8E84-426E-40dd-AFC4-6F175D3DCCD1}">
-              <a14:hiddenFill xmlns:a14="http://schemas.microsoft.com/office/drawing/2010/main" xmlns="">
+              <a14:hiddenFill xmlns="" xmlns:a14="http://schemas.microsoft.com/office/drawing/2010/main">
                 <a:solidFill>
                   <a:schemeClr val="accent1"/>
                 </a:solidFill>
               </a14:hiddenFill>
             </a:ext>
             <a:ext uri="{91240B29-F687-4f45-9708-019B960494DF}">
-              <a14:hiddenLine xmlns:a14="http://schemas.microsoft.com/office/drawing/2010/main" xmlns="" w="9525">
+              <a14:hiddenLine xmlns="" xmlns:a14="http://schemas.microsoft.com/office/drawing/2010/main" w="9525">
                 <a:solidFill>
                   <a:schemeClr val="tx1"/>
                 </a:solidFill>
@@ -602,7 +602,7 @@
               </a14:hiddenLine>
             </a:ext>
             <a:ext uri="{AF507438-7753-43e0-B8FC-AC1667EBCBE1}">
-              <a14:hiddenEffects xmlns:a14="http://schemas.microsoft.com/office/drawing/2010/main" xmlns="">
+              <a14:hiddenEffects xmlns="" xmlns:a14="http://schemas.microsoft.com/office/drawing/2010/main">
                 <a:effectLst>
                   <a:outerShdw dist="35921" dir="2700000" algn="ctr" rotWithShape="0">
                     <a:schemeClr val="bg2"/>
@@ -681,14 +681,14 @@
           <a:effectLst/>
           <a:extLst>
             <a:ext uri="{909E8E84-426E-40dd-AFC4-6F175D3DCCD1}">
-              <a14:hiddenFill xmlns:a14="http://schemas.microsoft.com/office/drawing/2010/main" xmlns="">
+              <a14:hiddenFill xmlns="" xmlns:a14="http://schemas.microsoft.com/office/drawing/2010/main">
                 <a:solidFill>
                   <a:schemeClr val="accent1"/>
                 </a:solidFill>
               </a14:hiddenFill>
             </a:ext>
             <a:ext uri="{91240B29-F687-4f45-9708-019B960494DF}">
-              <a14:hiddenLine xmlns:a14="http://schemas.microsoft.com/office/drawing/2010/main" xmlns="" w="9525">
+              <a14:hiddenLine xmlns="" xmlns:a14="http://schemas.microsoft.com/office/drawing/2010/main" w="9525">
                 <a:solidFill>
                   <a:schemeClr val="tx1"/>
                 </a:solidFill>
@@ -698,7 +698,7 @@
               </a14:hiddenLine>
             </a:ext>
             <a:ext uri="{AF507438-7753-43e0-B8FC-AC1667EBCBE1}">
-              <a14:hiddenEffects xmlns:a14="http://schemas.microsoft.com/office/drawing/2010/main" xmlns="">
+              <a14:hiddenEffects xmlns="" xmlns:a14="http://schemas.microsoft.com/office/drawing/2010/main">
                 <a:effectLst>
                   <a:outerShdw dist="35921" dir="2700000" algn="ctr" rotWithShape="0">
                     <a:schemeClr val="bg2"/>
@@ -751,14 +751,14 @@
           <a:effectLst/>
           <a:extLst>
             <a:ext uri="{909E8E84-426E-40dd-AFC4-6F175D3DCCD1}">
-              <a14:hiddenFill xmlns:a14="http://schemas.microsoft.com/office/drawing/2010/main" xmlns="">
+              <a14:hiddenFill xmlns="" xmlns:a14="http://schemas.microsoft.com/office/drawing/2010/main">
                 <a:solidFill>
                   <a:schemeClr val="accent1"/>
                 </a:solidFill>
               </a14:hiddenFill>
             </a:ext>
             <a:ext uri="{91240B29-F687-4f45-9708-019B960494DF}">
-              <a14:hiddenLine xmlns:a14="http://schemas.microsoft.com/office/drawing/2010/main" xmlns="" w="9525">
+              <a14:hiddenLine xmlns="" xmlns:a14="http://schemas.microsoft.com/office/drawing/2010/main" w="9525">
                 <a:solidFill>
                   <a:schemeClr val="tx1"/>
                 </a:solidFill>
@@ -768,7 +768,7 @@
               </a14:hiddenLine>
             </a:ext>
             <a:ext uri="{AF507438-7753-43e0-B8FC-AC1667EBCBE1}">
-              <a14:hiddenEffects xmlns:a14="http://schemas.microsoft.com/office/drawing/2010/main" xmlns="">
+              <a14:hiddenEffects xmlns="" xmlns:a14="http://schemas.microsoft.com/office/drawing/2010/main">
                 <a:effectLst>
                   <a:outerShdw dist="35921" dir="2700000" algn="ctr" rotWithShape="0">
                     <a:schemeClr val="bg2"/>
@@ -965,7 +965,7 @@
           <a:noFill/>
           <a:extLst>
             <a:ext uri="{AF507438-7753-43e0-B8FC-AC1667EBCBE1}">
-              <a14:hiddenEffects xmlns:a14="http://schemas.microsoft.com/office/drawing/2010/main" xmlns="">
+              <a14:hiddenEffects xmlns="" xmlns:a14="http://schemas.microsoft.com/office/drawing/2010/main">
                 <a:effectLst>
                   <a:outerShdw blurRad="63500" dist="38099" dir="2700000" algn="ctr" rotWithShape="0">
                     <a:schemeClr val="bg2">
@@ -1129,7 +1129,7 @@
           <a:noFill/>
           <a:extLst>
             <a:ext uri="{AF507438-7753-43e0-B8FC-AC1667EBCBE1}">
-              <a14:hiddenEffects xmlns:a14="http://schemas.microsoft.com/office/drawing/2010/main" xmlns="">
+              <a14:hiddenEffects xmlns="" xmlns:a14="http://schemas.microsoft.com/office/drawing/2010/main">
                 <a:effectLst>
                   <a:outerShdw blurRad="63500" dist="38099" dir="2700000" algn="ctr" rotWithShape="0">
                     <a:schemeClr val="bg2">
@@ -1197,7 +1197,7 @@
           <a:noFill/>
           <a:extLst>
             <a:ext uri="{AF507438-7753-43e0-B8FC-AC1667EBCBE1}">
-              <a14:hiddenEffects xmlns:a14="http://schemas.microsoft.com/office/drawing/2010/main" xmlns="">
+              <a14:hiddenEffects xmlns="" xmlns:a14="http://schemas.microsoft.com/office/drawing/2010/main">
                 <a:effectLst>
                   <a:outerShdw blurRad="63500" dist="38099" dir="2700000" algn="ctr" rotWithShape="0">
                     <a:schemeClr val="bg2">
@@ -1361,7 +1361,7 @@
           <a:noFill/>
           <a:extLst>
             <a:ext uri="{AF507438-7753-43e0-B8FC-AC1667EBCBE1}">
-              <a14:hiddenEffects xmlns:a14="http://schemas.microsoft.com/office/drawing/2010/main" xmlns="">
+              <a14:hiddenEffects xmlns="" xmlns:a14="http://schemas.microsoft.com/office/drawing/2010/main">
                 <a:effectLst>
                   <a:outerShdw blurRad="63500" dist="38099" dir="2700000" algn="ctr" rotWithShape="0">
                     <a:schemeClr val="bg2">
@@ -1432,7 +1432,7 @@
           <a:noFill/>
           <a:extLst>
             <a:ext uri="{AF507438-7753-43e0-B8FC-AC1667EBCBE1}">
-              <a14:hiddenEffects xmlns:a14="http://schemas.microsoft.com/office/drawing/2010/main" xmlns="">
+              <a14:hiddenEffects xmlns="" xmlns:a14="http://schemas.microsoft.com/office/drawing/2010/main">
                 <a:effectLst>
                   <a:outerShdw blurRad="63500" dist="38099" dir="2700000" algn="ctr" rotWithShape="0">
                     <a:schemeClr val="bg2">
@@ -1596,7 +1596,7 @@
           <a:noFill/>
           <a:extLst>
             <a:ext uri="{AF507438-7753-43e0-B8FC-AC1667EBCBE1}">
-              <a14:hiddenEffects xmlns:a14="http://schemas.microsoft.com/office/drawing/2010/main" xmlns="">
+              <a14:hiddenEffects xmlns="" xmlns:a14="http://schemas.microsoft.com/office/drawing/2010/main">
                 <a:effectLst>
                   <a:outerShdw blurRad="63500" dist="38099" dir="2700000" algn="ctr" rotWithShape="0">
                     <a:schemeClr val="bg2">
@@ -1667,7 +1667,7 @@
           <a:noFill/>
           <a:extLst>
             <a:ext uri="{AF507438-7753-43e0-B8FC-AC1667EBCBE1}">
-              <a14:hiddenEffects xmlns:a14="http://schemas.microsoft.com/office/drawing/2010/main" xmlns="">
+              <a14:hiddenEffects xmlns="" xmlns:a14="http://schemas.microsoft.com/office/drawing/2010/main">
                 <a:effectLst>
                   <a:outerShdw blurRad="63500" dist="38099" dir="2700000" algn="ctr" rotWithShape="0">
                     <a:schemeClr val="bg2">
@@ -1831,7 +1831,7 @@
           <a:noFill/>
           <a:extLst>
             <a:ext uri="{AF507438-7753-43e0-B8FC-AC1667EBCBE1}">
-              <a14:hiddenEffects xmlns:a14="http://schemas.microsoft.com/office/drawing/2010/main" xmlns="">
+              <a14:hiddenEffects xmlns="" xmlns:a14="http://schemas.microsoft.com/office/drawing/2010/main">
                 <a:effectLst>
                   <a:outerShdw blurRad="63500" dist="38099" dir="2700000" algn="ctr" rotWithShape="0">
                     <a:schemeClr val="bg2">
@@ -1899,7 +1899,7 @@
           <a:noFill/>
           <a:extLst>
             <a:ext uri="{AF507438-7753-43e0-B8FC-AC1667EBCBE1}">
-              <a14:hiddenEffects xmlns:a14="http://schemas.microsoft.com/office/drawing/2010/main" xmlns="">
+              <a14:hiddenEffects xmlns="" xmlns:a14="http://schemas.microsoft.com/office/drawing/2010/main">
                 <a:effectLst>
                   <a:outerShdw blurRad="63500" dist="38099" dir="2700000" algn="ctr" rotWithShape="0">
                     <a:schemeClr val="bg2">
@@ -2063,7 +2063,7 @@
           <a:noFill/>
           <a:extLst>
             <a:ext uri="{AF507438-7753-43e0-B8FC-AC1667EBCBE1}">
-              <a14:hiddenEffects xmlns:a14="http://schemas.microsoft.com/office/drawing/2010/main" xmlns="">
+              <a14:hiddenEffects xmlns="" xmlns:a14="http://schemas.microsoft.com/office/drawing/2010/main">
                 <a:effectLst>
                   <a:outerShdw blurRad="63500" dist="38099" dir="2700000" algn="ctr" rotWithShape="0">
                     <a:schemeClr val="bg2">
@@ -2131,7 +2131,7 @@
           <a:noFill/>
           <a:extLst>
             <a:ext uri="{AF507438-7753-43e0-B8FC-AC1667EBCBE1}">
-              <a14:hiddenEffects xmlns:a14="http://schemas.microsoft.com/office/drawing/2010/main" xmlns="">
+              <a14:hiddenEffects xmlns="" xmlns:a14="http://schemas.microsoft.com/office/drawing/2010/main">
                 <a:effectLst>
                   <a:outerShdw blurRad="63500" dist="38099" dir="2700000" algn="ctr" rotWithShape="0">
                     <a:schemeClr val="bg2">
@@ -2295,7 +2295,7 @@
           <a:noFill/>
           <a:extLst>
             <a:ext uri="{AF507438-7753-43e0-B8FC-AC1667EBCBE1}">
-              <a14:hiddenEffects xmlns:a14="http://schemas.microsoft.com/office/drawing/2010/main" xmlns="">
+              <a14:hiddenEffects xmlns="" xmlns:a14="http://schemas.microsoft.com/office/drawing/2010/main">
                 <a:effectLst>
                   <a:outerShdw blurRad="63500" dist="38099" dir="2700000" algn="ctr" rotWithShape="0">
                     <a:schemeClr val="bg2">
@@ -2448,7 +2448,7 @@
           <a:noFill/>
           <a:extLst>
             <a:ext uri="{AF507438-7753-43e0-B8FC-AC1667EBCBE1}">
-              <a14:hiddenEffects xmlns:a14="http://schemas.microsoft.com/office/drawing/2010/main" xmlns="">
+              <a14:hiddenEffects xmlns="" xmlns:a14="http://schemas.microsoft.com/office/drawing/2010/main">
                 <a:effectLst>
                   <a:outerShdw blurRad="63500" dist="38099" dir="2700000" algn="ctr" rotWithShape="0">
                     <a:schemeClr val="bg2">
@@ -2612,7 +2612,7 @@
           <a:noFill/>
           <a:extLst>
             <a:ext uri="{AF507438-7753-43e0-B8FC-AC1667EBCBE1}">
-              <a14:hiddenEffects xmlns:a14="http://schemas.microsoft.com/office/drawing/2010/main" xmlns="">
+              <a14:hiddenEffects xmlns="" xmlns:a14="http://schemas.microsoft.com/office/drawing/2010/main">
                 <a:effectLst>
                   <a:outerShdw blurRad="63500" dist="38099" dir="2700000" algn="ctr" rotWithShape="0">
                     <a:schemeClr val="bg2">
@@ -2864,7 +2864,7 @@
           <a:noFill/>
           <a:extLst>
             <a:ext uri="{AF507438-7753-43e0-B8FC-AC1667EBCBE1}">
-              <a14:hiddenEffects xmlns:a14="http://schemas.microsoft.com/office/drawing/2010/main" xmlns="">
+              <a14:hiddenEffects xmlns="" xmlns:a14="http://schemas.microsoft.com/office/drawing/2010/main">
                 <a:effectLst>
                   <a:outerShdw blurRad="63500" dist="38099" dir="2700000" algn="ctr" rotWithShape="0">
                     <a:schemeClr val="bg2">
@@ -3028,7 +3028,7 @@
           <a:noFill/>
           <a:extLst>
             <a:ext uri="{AF507438-7753-43e0-B8FC-AC1667EBCBE1}">
-              <a14:hiddenEffects xmlns:a14="http://schemas.microsoft.com/office/drawing/2010/main" xmlns="">
+              <a14:hiddenEffects xmlns="" xmlns:a14="http://schemas.microsoft.com/office/drawing/2010/main">
                 <a:effectLst>
                   <a:outerShdw blurRad="63500" dist="38099" dir="2700000" algn="ctr" rotWithShape="0">
                     <a:schemeClr val="bg2">
@@ -3103,7 +3103,7 @@
           <a:noFill/>
           <a:extLst>
             <a:ext uri="{AF507438-7753-43e0-B8FC-AC1667EBCBE1}">
-              <a14:hiddenEffects xmlns:a14="http://schemas.microsoft.com/office/drawing/2010/main" xmlns="">
+              <a14:hiddenEffects xmlns="" xmlns:a14="http://schemas.microsoft.com/office/drawing/2010/main">
                 <a:effectLst>
                   <a:outerShdw blurRad="63500" dist="38099" dir="2700000" algn="ctr" rotWithShape="0">
                     <a:schemeClr val="bg2">
@@ -3267,7 +3267,7 @@
           <a:noFill/>
           <a:extLst>
             <a:ext uri="{AF507438-7753-43e0-B8FC-AC1667EBCBE1}">
-              <a14:hiddenEffects xmlns:a14="http://schemas.microsoft.com/office/drawing/2010/main" xmlns="">
+              <a14:hiddenEffects xmlns="" xmlns:a14="http://schemas.microsoft.com/office/drawing/2010/main">
                 <a:effectLst>
                   <a:outerShdw blurRad="63500" dist="38099" dir="2700000" algn="ctr" rotWithShape="0">
                     <a:schemeClr val="bg2">
@@ -3438,7 +3438,7 @@
           <a:noFill/>
           <a:extLst>
             <a:ext uri="{AF507438-7753-43e0-B8FC-AC1667EBCBE1}">
-              <a14:hiddenEffects xmlns:a14="http://schemas.microsoft.com/office/drawing/2010/main" xmlns="">
+              <a14:hiddenEffects xmlns="" xmlns:a14="http://schemas.microsoft.com/office/drawing/2010/main">
                 <a:effectLst>
                   <a:outerShdw blurRad="63500" dist="38099" dir="2700000" algn="ctr" rotWithShape="0">
                     <a:schemeClr val="bg2">
@@ -3602,7 +3602,7 @@
           <a:noFill/>
           <a:extLst>
             <a:ext uri="{AF507438-7753-43e0-B8FC-AC1667EBCBE1}">
-              <a14:hiddenEffects xmlns:a14="http://schemas.microsoft.com/office/drawing/2010/main" xmlns="">
+              <a14:hiddenEffects xmlns="" xmlns:a14="http://schemas.microsoft.com/office/drawing/2010/main">
                 <a:effectLst>
                   <a:outerShdw blurRad="63500" dist="38099" dir="2700000" algn="ctr" rotWithShape="0">
                     <a:schemeClr val="bg2">
@@ -3673,7 +3673,7 @@
           <a:noFill/>
           <a:extLst>
             <a:ext uri="{AF507438-7753-43e0-B8FC-AC1667EBCBE1}">
-              <a14:hiddenEffects xmlns:a14="http://schemas.microsoft.com/office/drawing/2010/main" xmlns="">
+              <a14:hiddenEffects xmlns="" xmlns:a14="http://schemas.microsoft.com/office/drawing/2010/main">
                 <a:effectLst>
                   <a:outerShdw blurRad="63500" dist="38099" dir="2700000" algn="ctr" rotWithShape="0">
                     <a:schemeClr val="bg2">
@@ -3837,7 +3837,7 @@
           <a:noFill/>
           <a:extLst>
             <a:ext uri="{AF507438-7753-43e0-B8FC-AC1667EBCBE1}">
-              <a14:hiddenEffects xmlns:a14="http://schemas.microsoft.com/office/drawing/2010/main" xmlns="">
+              <a14:hiddenEffects xmlns="" xmlns:a14="http://schemas.microsoft.com/office/drawing/2010/main">
                 <a:effectLst>
                   <a:outerShdw blurRad="63500" dist="38099" dir="2700000" algn="ctr" rotWithShape="0">
                     <a:schemeClr val="bg2">
@@ -6597,17 +6597,17 @@
           <a:effectLst/>
           <a:extLst>
             <a:ext uri="{FAA26D3D-D897-4be2-8F04-BA451C77F1D7}">
-              <ma14:placeholderFlag xmlns:ma14="http://schemas.microsoft.com/office/mac/drawingml/2011/main" xmlns="" val="1"/>
+              <ma14:placeholderFlag xmlns="" xmlns:ma14="http://schemas.microsoft.com/office/mac/drawingml/2011/main" val="1"/>
             </a:ext>
             <a:ext uri="{909E8E84-426E-40dd-AFC4-6F175D3DCCD1}">
-              <a14:hiddenFill xmlns:a14="http://schemas.microsoft.com/office/drawing/2010/main" xmlns="">
+              <a14:hiddenFill xmlns="" xmlns:a14="http://schemas.microsoft.com/office/drawing/2010/main">
                 <a:solidFill>
                   <a:schemeClr val="accent1"/>
                 </a:solidFill>
               </a14:hiddenFill>
             </a:ext>
             <a:ext uri="{91240B29-F687-4f45-9708-019B960494DF}">
-              <a14:hiddenLine xmlns:a14="http://schemas.microsoft.com/office/drawing/2010/main" xmlns="" w="9525">
+              <a14:hiddenLine xmlns="" xmlns:a14="http://schemas.microsoft.com/office/drawing/2010/main" w="9525">
                 <a:solidFill>
                   <a:schemeClr val="tx1"/>
                 </a:solidFill>
@@ -6617,7 +6617,7 @@
               </a14:hiddenLine>
             </a:ext>
             <a:ext uri="{AF507438-7753-43e0-B8FC-AC1667EBCBE1}">
-              <a14:hiddenEffects xmlns:a14="http://schemas.microsoft.com/office/drawing/2010/main" xmlns="">
+              <a14:hiddenEffects xmlns="" xmlns:a14="http://schemas.microsoft.com/office/drawing/2010/main">
                 <a:effectLst>
                   <a:outerShdw blurRad="63500" dist="38099" dir="2700000" algn="ctr" rotWithShape="0">
                     <a:schemeClr val="bg2">
@@ -6670,17 +6670,17 @@
           <a:effectLst/>
           <a:extLst>
             <a:ext uri="{FAA26D3D-D897-4be2-8F04-BA451C77F1D7}">
-              <ma14:placeholderFlag xmlns:ma14="http://schemas.microsoft.com/office/mac/drawingml/2011/main" xmlns="" val="1"/>
+              <ma14:placeholderFlag xmlns="" xmlns:ma14="http://schemas.microsoft.com/office/mac/drawingml/2011/main" val="1"/>
             </a:ext>
             <a:ext uri="{909E8E84-426E-40dd-AFC4-6F175D3DCCD1}">
-              <a14:hiddenFill xmlns:a14="http://schemas.microsoft.com/office/drawing/2010/main" xmlns="">
+              <a14:hiddenFill xmlns="" xmlns:a14="http://schemas.microsoft.com/office/drawing/2010/main">
                 <a:solidFill>
                   <a:schemeClr val="accent1"/>
                 </a:solidFill>
               </a14:hiddenFill>
             </a:ext>
             <a:ext uri="{91240B29-F687-4f45-9708-019B960494DF}">
-              <a14:hiddenLine xmlns:a14="http://schemas.microsoft.com/office/drawing/2010/main" xmlns="" w="9525">
+              <a14:hiddenLine xmlns="" xmlns:a14="http://schemas.microsoft.com/office/drawing/2010/main" w="9525">
                 <a:solidFill>
                   <a:schemeClr val="tx1"/>
                 </a:solidFill>
@@ -6690,7 +6690,7 @@
               </a14:hiddenLine>
             </a:ext>
             <a:ext uri="{AF507438-7753-43e0-B8FC-AC1667EBCBE1}">
-              <a14:hiddenEffects xmlns:a14="http://schemas.microsoft.com/office/drawing/2010/main" xmlns="">
+              <a14:hiddenEffects xmlns="" xmlns:a14="http://schemas.microsoft.com/office/drawing/2010/main">
                 <a:effectLst>
                   <a:outerShdw blurRad="63500" dist="38099" dir="2700000" algn="ctr" rotWithShape="0">
                     <a:schemeClr val="bg2">
@@ -6771,14 +6771,14 @@
           <a:effectLst/>
           <a:extLst>
             <a:ext uri="{909E8E84-426E-40dd-AFC4-6F175D3DCCD1}">
-              <a14:hiddenFill xmlns:a14="http://schemas.microsoft.com/office/drawing/2010/main" xmlns="">
+              <a14:hiddenFill xmlns="" xmlns:a14="http://schemas.microsoft.com/office/drawing/2010/main">
                 <a:solidFill>
                   <a:schemeClr val="accent1"/>
                 </a:solidFill>
               </a14:hiddenFill>
             </a:ext>
             <a:ext uri="{91240B29-F687-4f45-9708-019B960494DF}">
-              <a14:hiddenLine xmlns:a14="http://schemas.microsoft.com/office/drawing/2010/main" xmlns="" w="9525">
+              <a14:hiddenLine xmlns="" xmlns:a14="http://schemas.microsoft.com/office/drawing/2010/main" w="9525">
                 <a:solidFill>
                   <a:schemeClr val="tx1"/>
                 </a:solidFill>
@@ -6788,7 +6788,7 @@
               </a14:hiddenLine>
             </a:ext>
             <a:ext uri="{AF507438-7753-43e0-B8FC-AC1667EBCBE1}">
-              <a14:hiddenEffects xmlns:a14="http://schemas.microsoft.com/office/drawing/2010/main" xmlns="">
+              <a14:hiddenEffects xmlns="" xmlns:a14="http://schemas.microsoft.com/office/drawing/2010/main">
                 <a:effectLst>
                   <a:outerShdw dist="35921" dir="2700000" algn="ctr" rotWithShape="0">
                     <a:schemeClr val="bg2"/>
@@ -6841,14 +6841,14 @@
           <a:effectLst/>
           <a:extLst>
             <a:ext uri="{909E8E84-426E-40dd-AFC4-6F175D3DCCD1}">
-              <a14:hiddenFill xmlns:a14="http://schemas.microsoft.com/office/drawing/2010/main" xmlns="">
+              <a14:hiddenFill xmlns="" xmlns:a14="http://schemas.microsoft.com/office/drawing/2010/main">
                 <a:solidFill>
                   <a:schemeClr val="accent1"/>
                 </a:solidFill>
               </a14:hiddenFill>
             </a:ext>
             <a:ext uri="{91240B29-F687-4f45-9708-019B960494DF}">
-              <a14:hiddenLine xmlns:a14="http://schemas.microsoft.com/office/drawing/2010/main" xmlns="" w="9525">
+              <a14:hiddenLine xmlns="" xmlns:a14="http://schemas.microsoft.com/office/drawing/2010/main" w="9525">
                 <a:solidFill>
                   <a:schemeClr val="tx1"/>
                 </a:solidFill>
@@ -6858,7 +6858,7 @@
               </a14:hiddenLine>
             </a:ext>
             <a:ext uri="{AF507438-7753-43e0-B8FC-AC1667EBCBE1}">
-              <a14:hiddenEffects xmlns:a14="http://schemas.microsoft.com/office/drawing/2010/main" xmlns="">
+              <a14:hiddenEffects xmlns="" xmlns:a14="http://schemas.microsoft.com/office/drawing/2010/main">
                 <a:effectLst>
                   <a:outerShdw dist="35921" dir="2700000" algn="ctr" rotWithShape="0">
                     <a:schemeClr val="bg2"/>
@@ -6911,14 +6911,14 @@
           <a:effectLst/>
           <a:extLst>
             <a:ext uri="{909E8E84-426E-40dd-AFC4-6F175D3DCCD1}">
-              <a14:hiddenFill xmlns:a14="http://schemas.microsoft.com/office/drawing/2010/main" xmlns="">
+              <a14:hiddenFill xmlns="" xmlns:a14="http://schemas.microsoft.com/office/drawing/2010/main">
                 <a:solidFill>
                   <a:schemeClr val="accent1"/>
                 </a:solidFill>
               </a14:hiddenFill>
             </a:ext>
             <a:ext uri="{91240B29-F687-4f45-9708-019B960494DF}">
-              <a14:hiddenLine xmlns:a14="http://schemas.microsoft.com/office/drawing/2010/main" xmlns="" w="9525">
+              <a14:hiddenLine xmlns="" xmlns:a14="http://schemas.microsoft.com/office/drawing/2010/main" w="9525">
                 <a:solidFill>
                   <a:schemeClr val="tx1"/>
                 </a:solidFill>
@@ -6928,7 +6928,7 @@
               </a14:hiddenLine>
             </a:ext>
             <a:ext uri="{AF507438-7753-43e0-B8FC-AC1667EBCBE1}">
-              <a14:hiddenEffects xmlns:a14="http://schemas.microsoft.com/office/drawing/2010/main" xmlns="">
+              <a14:hiddenEffects xmlns="" xmlns:a14="http://schemas.microsoft.com/office/drawing/2010/main">
                 <a:effectLst>
                   <a:outerShdw dist="35921" dir="2700000" algn="ctr" rotWithShape="0">
                     <a:schemeClr val="bg2"/>
@@ -7408,14 +7408,14 @@
           <a:effectLst/>
           <a:extLst>
             <a:ext uri="{909E8E84-426E-40dd-AFC4-6F175D3DCCD1}">
-              <a14:hiddenFill xmlns:a14="http://schemas.microsoft.com/office/drawing/2010/main" xmlns="">
+              <a14:hiddenFill xmlns="" xmlns:a14="http://schemas.microsoft.com/office/drawing/2010/main">
                 <a:solidFill>
                   <a:schemeClr val="accent1"/>
                 </a:solidFill>
               </a14:hiddenFill>
             </a:ext>
             <a:ext uri="{91240B29-F687-4f45-9708-019B960494DF}">
-              <a14:hiddenLine xmlns:a14="http://schemas.microsoft.com/office/drawing/2010/main" xmlns="" w="9525">
+              <a14:hiddenLine xmlns="" xmlns:a14="http://schemas.microsoft.com/office/drawing/2010/main" w="9525">
                 <a:solidFill>
                   <a:schemeClr val="tx1"/>
                 </a:solidFill>
@@ -7425,7 +7425,7 @@
               </a14:hiddenLine>
             </a:ext>
             <a:ext uri="{AF507438-7753-43e0-B8FC-AC1667EBCBE1}">
-              <a14:hiddenEffects xmlns:a14="http://schemas.microsoft.com/office/drawing/2010/main" xmlns="">
+              <a14:hiddenEffects xmlns="" xmlns:a14="http://schemas.microsoft.com/office/drawing/2010/main">
                 <a:effectLst>
                   <a:outerShdw blurRad="63500" dist="38099" dir="2700000" algn="ctr" rotWithShape="0">
                     <a:schemeClr val="bg2">
@@ -7568,14 +7568,14 @@
           <a:effectLst/>
           <a:extLst>
             <a:ext uri="{909E8E84-426E-40dd-AFC4-6F175D3DCCD1}">
-              <a14:hiddenFill xmlns:a14="http://schemas.microsoft.com/office/drawing/2010/main" xmlns="">
+              <a14:hiddenFill xmlns="" xmlns:a14="http://schemas.microsoft.com/office/drawing/2010/main">
                 <a:solidFill>
                   <a:schemeClr val="accent1"/>
                 </a:solidFill>
               </a14:hiddenFill>
             </a:ext>
             <a:ext uri="{91240B29-F687-4f45-9708-019B960494DF}">
-              <a14:hiddenLine xmlns:a14="http://schemas.microsoft.com/office/drawing/2010/main" xmlns="" w="9525">
+              <a14:hiddenLine xmlns="" xmlns:a14="http://schemas.microsoft.com/office/drawing/2010/main" w="9525">
                 <a:solidFill>
                   <a:schemeClr val="tx1"/>
                 </a:solidFill>
@@ -7585,7 +7585,7 @@
               </a14:hiddenLine>
             </a:ext>
             <a:ext uri="{AF507438-7753-43e0-B8FC-AC1667EBCBE1}">
-              <a14:hiddenEffects xmlns:a14="http://schemas.microsoft.com/office/drawing/2010/main" xmlns="">
+              <a14:hiddenEffects xmlns="" xmlns:a14="http://schemas.microsoft.com/office/drawing/2010/main">
                 <a:effectLst>
                   <a:outerShdw blurRad="63500" dist="38099" dir="2700000" algn="ctr" rotWithShape="0">
                     <a:schemeClr val="bg2">
@@ -7700,7 +7700,7 @@
                 <a:ea typeface="新細明體" charset="0"/>
                 <a:cs typeface="新細明體" charset="0"/>
               </a:rPr>
-              <a:t>By: Mohammed </a:t>
+              <a:t>Mohammed </a:t>
             </a:r>
             <a:r>
               <a:rPr lang="en-US" altLang="zh-TW" sz="2200" dirty="0" err="1">
@@ -7744,7 +7744,7 @@
                 <a:ea typeface="新細明體" charset="0"/>
                 <a:cs typeface="新細明體" charset="0"/>
               </a:rPr>
-              <a:t>, Ruediger Ehlers, Bettina </a:t>
+              <a:t>, Ruediger Ehlers, Bettina y: </a:t>
             </a:r>
             <a:r>
               <a:rPr lang="en-US" altLang="zh-TW" sz="2200" dirty="0" err="1">
@@ -7862,7 +7862,7 @@
                 <a:ea typeface="新細明體" charset="0"/>
                 <a:cs typeface="新細明體" charset="0"/>
               </a:rPr>
-              <a:t>Reproduced by: Carl Hildebrandt</a:t>
+              <a:t>Slides By: Carl Hildebrandt</a:t>
             </a:r>
           </a:p>
         </p:txBody>
@@ -7890,14 +7890,14 @@
           <a:effectLst/>
           <a:extLst>
             <a:ext uri="{909E8E84-426E-40dd-AFC4-6F175D3DCCD1}">
-              <a14:hiddenFill xmlns:a14="http://schemas.microsoft.com/office/drawing/2010/main" xmlns="">
+              <a14:hiddenFill xmlns="" xmlns:a14="http://schemas.microsoft.com/office/drawing/2010/main">
                 <a:solidFill>
                   <a:schemeClr val="accent1"/>
                 </a:solidFill>
               </a14:hiddenFill>
             </a:ext>
             <a:ext uri="{91240B29-F687-4f45-9708-019B960494DF}">
-              <a14:hiddenLine xmlns:a14="http://schemas.microsoft.com/office/drawing/2010/main" xmlns="" w="9525">
+              <a14:hiddenLine xmlns="" xmlns:a14="http://schemas.microsoft.com/office/drawing/2010/main" w="9525">
                 <a:solidFill>
                   <a:schemeClr val="tx1"/>
                 </a:solidFill>
@@ -7907,7 +7907,7 @@
               </a14:hiddenLine>
             </a:ext>
             <a:ext uri="{AF507438-7753-43e0-B8FC-AC1667EBCBE1}">
-              <a14:hiddenEffects xmlns:a14="http://schemas.microsoft.com/office/drawing/2010/main" xmlns="">
+              <a14:hiddenEffects xmlns="" xmlns:a14="http://schemas.microsoft.com/office/drawing/2010/main">
                 <a:effectLst>
                   <a:outerShdw blurRad="63500" dist="38099" dir="2700000" algn="ctr" rotWithShape="0">
                     <a:schemeClr val="bg2">
@@ -8099,14 +8099,14 @@
           <a:effectLst/>
           <a:extLst>
             <a:ext uri="{909E8E84-426E-40dd-AFC4-6F175D3DCCD1}">
-              <a14:hiddenFill xmlns:a14="http://schemas.microsoft.com/office/drawing/2010/main" xmlns="">
+              <a14:hiddenFill xmlns="" xmlns:a14="http://schemas.microsoft.com/office/drawing/2010/main">
                 <a:solidFill>
                   <a:schemeClr val="accent1"/>
                 </a:solidFill>
               </a14:hiddenFill>
             </a:ext>
             <a:ext uri="{91240B29-F687-4f45-9708-019B960494DF}">
-              <a14:hiddenLine xmlns:a14="http://schemas.microsoft.com/office/drawing/2010/main" xmlns="" w="9525">
+              <a14:hiddenLine xmlns="" xmlns:a14="http://schemas.microsoft.com/office/drawing/2010/main" w="9525">
                 <a:solidFill>
                   <a:schemeClr val="tx1"/>
                 </a:solidFill>
@@ -8116,7 +8116,7 @@
               </a14:hiddenLine>
             </a:ext>
             <a:ext uri="{AF507438-7753-43e0-B8FC-AC1667EBCBE1}">
-              <a14:hiddenEffects xmlns:a14="http://schemas.microsoft.com/office/drawing/2010/main" xmlns="">
+              <a14:hiddenEffects xmlns="" xmlns:a14="http://schemas.microsoft.com/office/drawing/2010/main">
                 <a:effectLst>
                   <a:outerShdw blurRad="63500" dist="38099" dir="2700000" algn="ctr" rotWithShape="0">
                     <a:schemeClr val="bg2">
@@ -8949,14 +8949,14 @@
           <a:effectLst/>
           <a:extLst>
             <a:ext uri="{909E8E84-426E-40dd-AFC4-6F175D3DCCD1}">
-              <a14:hiddenFill xmlns:a14="http://schemas.microsoft.com/office/drawing/2010/main" xmlns="">
+              <a14:hiddenFill xmlns="" xmlns:a14="http://schemas.microsoft.com/office/drawing/2010/main">
                 <a:solidFill>
                   <a:schemeClr val="accent1"/>
                 </a:solidFill>
               </a14:hiddenFill>
             </a:ext>
             <a:ext uri="{91240B29-F687-4f45-9708-019B960494DF}">
-              <a14:hiddenLine xmlns:a14="http://schemas.microsoft.com/office/drawing/2010/main" xmlns="" w="9525">
+              <a14:hiddenLine xmlns="" xmlns:a14="http://schemas.microsoft.com/office/drawing/2010/main" w="9525">
                 <a:solidFill>
                   <a:schemeClr val="tx1"/>
                 </a:solidFill>
@@ -8966,7 +8966,7 @@
               </a14:hiddenLine>
             </a:ext>
             <a:ext uri="{AF507438-7753-43e0-B8FC-AC1667EBCBE1}">
-              <a14:hiddenEffects xmlns:a14="http://schemas.microsoft.com/office/drawing/2010/main" xmlns="">
+              <a14:hiddenEffects xmlns="" xmlns:a14="http://schemas.microsoft.com/office/drawing/2010/main">
                 <a:effectLst>
                   <a:outerShdw blurRad="63500" dist="38099" dir="2700000" algn="ctr" rotWithShape="0">
                     <a:schemeClr val="bg2">
@@ -9823,14 +9823,14 @@
           <a:effectLst/>
           <a:extLst>
             <a:ext uri="{909E8E84-426E-40dd-AFC4-6F175D3DCCD1}">
-              <a14:hiddenFill xmlns:a14="http://schemas.microsoft.com/office/drawing/2010/main" xmlns="">
+              <a14:hiddenFill xmlns="" xmlns:a14="http://schemas.microsoft.com/office/drawing/2010/main">
                 <a:solidFill>
                   <a:schemeClr val="accent1"/>
                 </a:solidFill>
               </a14:hiddenFill>
             </a:ext>
             <a:ext uri="{91240B29-F687-4f45-9708-019B960494DF}">
-              <a14:hiddenLine xmlns:a14="http://schemas.microsoft.com/office/drawing/2010/main" xmlns="" w="9525">
+              <a14:hiddenLine xmlns="" xmlns:a14="http://schemas.microsoft.com/office/drawing/2010/main" w="9525">
                 <a:solidFill>
                   <a:schemeClr val="tx1"/>
                 </a:solidFill>
@@ -9840,7 +9840,7 @@
               </a14:hiddenLine>
             </a:ext>
             <a:ext uri="{AF507438-7753-43e0-B8FC-AC1667EBCBE1}">
-              <a14:hiddenEffects xmlns:a14="http://schemas.microsoft.com/office/drawing/2010/main" xmlns="">
+              <a14:hiddenEffects xmlns="" xmlns:a14="http://schemas.microsoft.com/office/drawing/2010/main">
                 <a:effectLst>
                   <a:outerShdw blurRad="63500" dist="38099" dir="2700000" algn="ctr" rotWithShape="0">
                     <a:schemeClr val="bg2">
@@ -10706,14 +10706,14 @@
           <a:effectLst/>
           <a:extLst>
             <a:ext uri="{909E8E84-426E-40dd-AFC4-6F175D3DCCD1}">
-              <a14:hiddenFill xmlns:a14="http://schemas.microsoft.com/office/drawing/2010/main" xmlns="">
+              <a14:hiddenFill xmlns="" xmlns:a14="http://schemas.microsoft.com/office/drawing/2010/main">
                 <a:solidFill>
                   <a:schemeClr val="accent1"/>
                 </a:solidFill>
               </a14:hiddenFill>
             </a:ext>
             <a:ext uri="{91240B29-F687-4f45-9708-019B960494DF}">
-              <a14:hiddenLine xmlns:a14="http://schemas.microsoft.com/office/drawing/2010/main" xmlns="" w="9525">
+              <a14:hiddenLine xmlns="" xmlns:a14="http://schemas.microsoft.com/office/drawing/2010/main" w="9525">
                 <a:solidFill>
                   <a:schemeClr val="tx1"/>
                 </a:solidFill>
@@ -10723,7 +10723,7 @@
               </a14:hiddenLine>
             </a:ext>
             <a:ext uri="{AF507438-7753-43e0-B8FC-AC1667EBCBE1}">
-              <a14:hiddenEffects xmlns:a14="http://schemas.microsoft.com/office/drawing/2010/main" xmlns="">
+              <a14:hiddenEffects xmlns="" xmlns:a14="http://schemas.microsoft.com/office/drawing/2010/main">
                 <a:effectLst>
                   <a:outerShdw blurRad="63500" dist="38099" dir="2700000" algn="ctr" rotWithShape="0">
                     <a:schemeClr val="bg2">
@@ -11219,14 +11219,14 @@
           <a:effectLst/>
           <a:extLst>
             <a:ext uri="{909E8E84-426E-40dd-AFC4-6F175D3DCCD1}">
-              <a14:hiddenFill xmlns:a14="http://schemas.microsoft.com/office/drawing/2010/main" xmlns="">
+              <a14:hiddenFill xmlns="" xmlns:a14="http://schemas.microsoft.com/office/drawing/2010/main">
                 <a:solidFill>
                   <a:schemeClr val="accent1"/>
                 </a:solidFill>
               </a14:hiddenFill>
             </a:ext>
             <a:ext uri="{91240B29-F687-4f45-9708-019B960494DF}">
-              <a14:hiddenLine xmlns:a14="http://schemas.microsoft.com/office/drawing/2010/main" xmlns="" w="9525">
+              <a14:hiddenLine xmlns="" xmlns:a14="http://schemas.microsoft.com/office/drawing/2010/main" w="9525">
                 <a:solidFill>
                   <a:schemeClr val="tx1"/>
                 </a:solidFill>
@@ -11236,7 +11236,7 @@
               </a14:hiddenLine>
             </a:ext>
             <a:ext uri="{AF507438-7753-43e0-B8FC-AC1667EBCBE1}">
-              <a14:hiddenEffects xmlns:a14="http://schemas.microsoft.com/office/drawing/2010/main" xmlns="">
+              <a14:hiddenEffects xmlns="" xmlns:a14="http://schemas.microsoft.com/office/drawing/2010/main">
                 <a:effectLst>
                   <a:outerShdw blurRad="63500" dist="38099" dir="2700000" algn="ctr" rotWithShape="0">
                     <a:schemeClr val="bg2">
@@ -11596,14 +11596,14 @@
           <a:effectLst/>
           <a:extLst>
             <a:ext uri="{909E8E84-426E-40dd-AFC4-6F175D3DCCD1}">
-              <a14:hiddenFill xmlns:a14="http://schemas.microsoft.com/office/drawing/2010/main" xmlns="">
+              <a14:hiddenFill xmlns="" xmlns:a14="http://schemas.microsoft.com/office/drawing/2010/main">
                 <a:solidFill>
                   <a:schemeClr val="accent1"/>
                 </a:solidFill>
               </a14:hiddenFill>
             </a:ext>
             <a:ext uri="{91240B29-F687-4f45-9708-019B960494DF}">
-              <a14:hiddenLine xmlns:a14="http://schemas.microsoft.com/office/drawing/2010/main" xmlns="" w="9525">
+              <a14:hiddenLine xmlns="" xmlns:a14="http://schemas.microsoft.com/office/drawing/2010/main" w="9525">
                 <a:solidFill>
                   <a:schemeClr val="tx1"/>
                 </a:solidFill>
@@ -11613,7 +11613,7 @@
               </a14:hiddenLine>
             </a:ext>
             <a:ext uri="{AF507438-7753-43e0-B8FC-AC1667EBCBE1}">
-              <a14:hiddenEffects xmlns:a14="http://schemas.microsoft.com/office/drawing/2010/main" xmlns="">
+              <a14:hiddenEffects xmlns="" xmlns:a14="http://schemas.microsoft.com/office/drawing/2010/main">
                 <a:effectLst>
                   <a:outerShdw blurRad="63500" dist="38099" dir="2700000" algn="ctr" rotWithShape="0">
                     <a:schemeClr val="bg2">
@@ -11668,14 +11668,14 @@
           </a:ln>
           <a:extLst>
             <a:ext uri="{909E8E84-426E-40dd-AFC4-6F175D3DCCD1}">
-              <a14:hiddenFill xmlns:a14="http://schemas.microsoft.com/office/drawing/2010/main" xmlns="">
+              <a14:hiddenFill xmlns="" xmlns:a14="http://schemas.microsoft.com/office/drawing/2010/main">
                 <a:solidFill>
                   <a:srgbClr val="FFFFFF"/>
                 </a:solidFill>
               </a14:hiddenFill>
             </a:ext>
             <a:ext uri="{91240B29-F687-4f45-9708-019B960494DF}">
-              <a14:hiddenLine xmlns:a14="http://schemas.microsoft.com/office/drawing/2010/main" xmlns="" w="9525">
+              <a14:hiddenLine xmlns="" xmlns:a14="http://schemas.microsoft.com/office/drawing/2010/main" w="9525">
                 <a:solidFill>
                   <a:srgbClr val="000000"/>
                 </a:solidFill>
@@ -12006,14 +12006,14 @@
           <a:effectLst/>
           <a:extLst>
             <a:ext uri="{909E8E84-426E-40dd-AFC4-6F175D3DCCD1}">
-              <a14:hiddenFill xmlns:a14="http://schemas.microsoft.com/office/drawing/2010/main" xmlns="">
+              <a14:hiddenFill xmlns="" xmlns:a14="http://schemas.microsoft.com/office/drawing/2010/main">
                 <a:solidFill>
                   <a:schemeClr val="accent1"/>
                 </a:solidFill>
               </a14:hiddenFill>
             </a:ext>
             <a:ext uri="{91240B29-F687-4f45-9708-019B960494DF}">
-              <a14:hiddenLine xmlns:a14="http://schemas.microsoft.com/office/drawing/2010/main" xmlns="" w="9525">
+              <a14:hiddenLine xmlns="" xmlns:a14="http://schemas.microsoft.com/office/drawing/2010/main" w="9525">
                 <a:solidFill>
                   <a:schemeClr val="tx1"/>
                 </a:solidFill>
@@ -12023,7 +12023,7 @@
               </a14:hiddenLine>
             </a:ext>
             <a:ext uri="{AF507438-7753-43e0-B8FC-AC1667EBCBE1}">
-              <a14:hiddenEffects xmlns:a14="http://schemas.microsoft.com/office/drawing/2010/main" xmlns="">
+              <a14:hiddenEffects xmlns="" xmlns:a14="http://schemas.microsoft.com/office/drawing/2010/main">
                 <a:effectLst>
                   <a:outerShdw blurRad="63500" dist="38099" dir="2700000" algn="ctr" rotWithShape="0">
                     <a:schemeClr val="bg2">
@@ -12078,14 +12078,14 @@
           </a:ln>
           <a:extLst>
             <a:ext uri="{909E8E84-426E-40dd-AFC4-6F175D3DCCD1}">
-              <a14:hiddenFill xmlns:a14="http://schemas.microsoft.com/office/drawing/2010/main" xmlns="">
+              <a14:hiddenFill xmlns="" xmlns:a14="http://schemas.microsoft.com/office/drawing/2010/main">
                 <a:solidFill>
                   <a:srgbClr val="FFFFFF"/>
                 </a:solidFill>
               </a14:hiddenFill>
             </a:ext>
             <a:ext uri="{91240B29-F687-4f45-9708-019B960494DF}">
-              <a14:hiddenLine xmlns:a14="http://schemas.microsoft.com/office/drawing/2010/main" xmlns="" w="9525">
+              <a14:hiddenLine xmlns="" xmlns:a14="http://schemas.microsoft.com/office/drawing/2010/main" w="9525">
                 <a:solidFill>
                   <a:srgbClr val="000000"/>
                 </a:solidFill>
@@ -12884,14 +12884,14 @@
           <a:effectLst/>
           <a:extLst>
             <a:ext uri="{909E8E84-426E-40dd-AFC4-6F175D3DCCD1}">
-              <a14:hiddenFill xmlns:a14="http://schemas.microsoft.com/office/drawing/2010/main" xmlns="">
+              <a14:hiddenFill xmlns="" xmlns:a14="http://schemas.microsoft.com/office/drawing/2010/main">
                 <a:solidFill>
                   <a:schemeClr val="accent1"/>
                 </a:solidFill>
               </a14:hiddenFill>
             </a:ext>
             <a:ext uri="{91240B29-F687-4f45-9708-019B960494DF}">
-              <a14:hiddenLine xmlns:a14="http://schemas.microsoft.com/office/drawing/2010/main" xmlns="" w="9525">
+              <a14:hiddenLine xmlns="" xmlns:a14="http://schemas.microsoft.com/office/drawing/2010/main" w="9525">
                 <a:solidFill>
                   <a:schemeClr val="tx1"/>
                 </a:solidFill>
@@ -12901,7 +12901,7 @@
               </a14:hiddenLine>
             </a:ext>
             <a:ext uri="{AF507438-7753-43e0-B8FC-AC1667EBCBE1}">
-              <a14:hiddenEffects xmlns:a14="http://schemas.microsoft.com/office/drawing/2010/main" xmlns="">
+              <a14:hiddenEffects xmlns="" xmlns:a14="http://schemas.microsoft.com/office/drawing/2010/main">
                 <a:effectLst>
                   <a:outerShdw blurRad="63500" dist="38099" dir="2700000" algn="ctr" rotWithShape="0">
                     <a:schemeClr val="bg2">
@@ -13611,14 +13611,14 @@
           <a:effectLst/>
           <a:extLst>
             <a:ext uri="{909E8E84-426E-40dd-AFC4-6F175D3DCCD1}">
-              <a14:hiddenFill xmlns:a14="http://schemas.microsoft.com/office/drawing/2010/main" xmlns="">
+              <a14:hiddenFill xmlns="" xmlns:a14="http://schemas.microsoft.com/office/drawing/2010/main">
                 <a:solidFill>
                   <a:schemeClr val="accent1"/>
                 </a:solidFill>
               </a14:hiddenFill>
             </a:ext>
             <a:ext uri="{91240B29-F687-4f45-9708-019B960494DF}">
-              <a14:hiddenLine xmlns:a14="http://schemas.microsoft.com/office/drawing/2010/main" xmlns="" w="9525">
+              <a14:hiddenLine xmlns="" xmlns:a14="http://schemas.microsoft.com/office/drawing/2010/main" w="9525">
                 <a:solidFill>
                   <a:schemeClr val="tx1"/>
                 </a:solidFill>
@@ -13628,7 +13628,7 @@
               </a14:hiddenLine>
             </a:ext>
             <a:ext uri="{AF507438-7753-43e0-B8FC-AC1667EBCBE1}">
-              <a14:hiddenEffects xmlns:a14="http://schemas.microsoft.com/office/drawing/2010/main" xmlns="">
+              <a14:hiddenEffects xmlns="" xmlns:a14="http://schemas.microsoft.com/office/drawing/2010/main">
                 <a:effectLst>
                   <a:outerShdw blurRad="63500" dist="38099" dir="2700000" algn="ctr" rotWithShape="0">
                     <a:schemeClr val="bg2">
@@ -14316,14 +14316,14 @@
           <a:effectLst/>
           <a:extLst>
             <a:ext uri="{909E8E84-426E-40dd-AFC4-6F175D3DCCD1}">
-              <a14:hiddenFill xmlns:a14="http://schemas.microsoft.com/office/drawing/2010/main" xmlns="">
+              <a14:hiddenFill xmlns="" xmlns:a14="http://schemas.microsoft.com/office/drawing/2010/main">
                 <a:solidFill>
                   <a:schemeClr val="accent1"/>
                 </a:solidFill>
               </a14:hiddenFill>
             </a:ext>
             <a:ext uri="{91240B29-F687-4f45-9708-019B960494DF}">
-              <a14:hiddenLine xmlns:a14="http://schemas.microsoft.com/office/drawing/2010/main" xmlns="" w="9525">
+              <a14:hiddenLine xmlns="" xmlns:a14="http://schemas.microsoft.com/office/drawing/2010/main" w="9525">
                 <a:solidFill>
                   <a:schemeClr val="tx1"/>
                 </a:solidFill>
@@ -14333,7 +14333,7 @@
               </a14:hiddenLine>
             </a:ext>
             <a:ext uri="{AF507438-7753-43e0-B8FC-AC1667EBCBE1}">
-              <a14:hiddenEffects xmlns:a14="http://schemas.microsoft.com/office/drawing/2010/main" xmlns="">
+              <a14:hiddenEffects xmlns="" xmlns:a14="http://schemas.microsoft.com/office/drawing/2010/main">
                 <a:effectLst>
                   <a:outerShdw blurRad="63500" dist="38099" dir="2700000" algn="ctr" rotWithShape="0">
                     <a:schemeClr val="bg2">
@@ -14855,14 +14855,14 @@
           <a:effectLst/>
           <a:extLst>
             <a:ext uri="{909E8E84-426E-40dd-AFC4-6F175D3DCCD1}">
-              <a14:hiddenFill xmlns:a14="http://schemas.microsoft.com/office/drawing/2010/main" xmlns="">
+              <a14:hiddenFill xmlns="" xmlns:a14="http://schemas.microsoft.com/office/drawing/2010/main">
                 <a:solidFill>
                   <a:schemeClr val="accent1"/>
                 </a:solidFill>
               </a14:hiddenFill>
             </a:ext>
             <a:ext uri="{91240B29-F687-4f45-9708-019B960494DF}">
-              <a14:hiddenLine xmlns:a14="http://schemas.microsoft.com/office/drawing/2010/main" xmlns="" w="9525">
+              <a14:hiddenLine xmlns="" xmlns:a14="http://schemas.microsoft.com/office/drawing/2010/main" w="9525">
                 <a:solidFill>
                   <a:schemeClr val="tx1"/>
                 </a:solidFill>
@@ -14872,7 +14872,7 @@
               </a14:hiddenLine>
             </a:ext>
             <a:ext uri="{AF507438-7753-43e0-B8FC-AC1667EBCBE1}">
-              <a14:hiddenEffects xmlns:a14="http://schemas.microsoft.com/office/drawing/2010/main" xmlns="">
+              <a14:hiddenEffects xmlns="" xmlns:a14="http://schemas.microsoft.com/office/drawing/2010/main">
                 <a:effectLst>
                   <a:outerShdw blurRad="63500" dist="38099" dir="2700000" algn="ctr" rotWithShape="0">
                     <a:schemeClr val="bg2">
@@ -15604,14 +15604,14 @@
           <a:effectLst/>
           <a:extLst>
             <a:ext uri="{909E8E84-426E-40dd-AFC4-6F175D3DCCD1}">
-              <a14:hiddenFill xmlns:a14="http://schemas.microsoft.com/office/drawing/2010/main" xmlns="">
+              <a14:hiddenFill xmlns="" xmlns:a14="http://schemas.microsoft.com/office/drawing/2010/main">
                 <a:solidFill>
                   <a:schemeClr val="accent1"/>
                 </a:solidFill>
               </a14:hiddenFill>
             </a:ext>
             <a:ext uri="{91240B29-F687-4f45-9708-019B960494DF}">
-              <a14:hiddenLine xmlns:a14="http://schemas.microsoft.com/office/drawing/2010/main" xmlns="" w="9525">
+              <a14:hiddenLine xmlns="" xmlns:a14="http://schemas.microsoft.com/office/drawing/2010/main" w="9525">
                 <a:solidFill>
                   <a:schemeClr val="tx1"/>
                 </a:solidFill>
@@ -15621,7 +15621,7 @@
               </a14:hiddenLine>
             </a:ext>
             <a:ext uri="{AF507438-7753-43e0-B8FC-AC1667EBCBE1}">
-              <a14:hiddenEffects xmlns:a14="http://schemas.microsoft.com/office/drawing/2010/main" xmlns="">
+              <a14:hiddenEffects xmlns="" xmlns:a14="http://schemas.microsoft.com/office/drawing/2010/main">
                 <a:effectLst>
                   <a:outerShdw blurRad="63500" dist="38099" dir="2700000" algn="ctr" rotWithShape="0">
                     <a:schemeClr val="bg2">
@@ -16059,14 +16059,14 @@
           <a:effectLst/>
           <a:extLst>
             <a:ext uri="{909E8E84-426E-40dd-AFC4-6F175D3DCCD1}">
-              <a14:hiddenFill xmlns:a14="http://schemas.microsoft.com/office/drawing/2010/main" xmlns="">
+              <a14:hiddenFill xmlns="" xmlns:a14="http://schemas.microsoft.com/office/drawing/2010/main">
                 <a:solidFill>
                   <a:schemeClr val="accent1"/>
                 </a:solidFill>
               </a14:hiddenFill>
             </a:ext>
             <a:ext uri="{91240B29-F687-4f45-9708-019B960494DF}">
-              <a14:hiddenLine xmlns:a14="http://schemas.microsoft.com/office/drawing/2010/main" xmlns="" w="9525">
+              <a14:hiddenLine xmlns="" xmlns:a14="http://schemas.microsoft.com/office/drawing/2010/main" w="9525">
                 <a:solidFill>
                   <a:schemeClr val="tx1"/>
                 </a:solidFill>
@@ -16076,7 +16076,7 @@
               </a14:hiddenLine>
             </a:ext>
             <a:ext uri="{AF507438-7753-43e0-B8FC-AC1667EBCBE1}">
-              <a14:hiddenEffects xmlns:a14="http://schemas.microsoft.com/office/drawing/2010/main" xmlns="">
+              <a14:hiddenEffects xmlns="" xmlns:a14="http://schemas.microsoft.com/office/drawing/2010/main">
                 <a:effectLst>
                   <a:outerShdw blurRad="63500" dist="38099" dir="2700000" algn="ctr" rotWithShape="0">
                     <a:schemeClr val="bg2">
@@ -16238,7 +16238,7 @@
           <a:noFill/>
           <a:extLst>
             <a:ext uri="{909E8E84-426E-40dd-AFC4-6F175D3DCCD1}">
-              <a14:hiddenFill xmlns:a14="http://schemas.microsoft.com/office/drawing/2010/main" xmlns="">
+              <a14:hiddenFill xmlns="" xmlns:a14="http://schemas.microsoft.com/office/drawing/2010/main">
                 <a:solidFill>
                   <a:srgbClr val="FFFFFF"/>
                 </a:solidFill>
@@ -16277,7 +16277,7 @@
           <a:noFill/>
           <a:extLst>
             <a:ext uri="{909E8E84-426E-40dd-AFC4-6F175D3DCCD1}">
-              <a14:hiddenFill xmlns:a14="http://schemas.microsoft.com/office/drawing/2010/main" xmlns="">
+              <a14:hiddenFill xmlns="" xmlns:a14="http://schemas.microsoft.com/office/drawing/2010/main">
                 <a:solidFill>
                   <a:srgbClr val="FFFFFF"/>
                 </a:solidFill>
@@ -16450,14 +16450,14 @@
           <a:effectLst/>
           <a:extLst>
             <a:ext uri="{909E8E84-426E-40dd-AFC4-6F175D3DCCD1}">
-              <a14:hiddenFill xmlns:a14="http://schemas.microsoft.com/office/drawing/2010/main" xmlns="">
+              <a14:hiddenFill xmlns="" xmlns:a14="http://schemas.microsoft.com/office/drawing/2010/main">
                 <a:solidFill>
                   <a:schemeClr val="accent1"/>
                 </a:solidFill>
               </a14:hiddenFill>
             </a:ext>
             <a:ext uri="{91240B29-F687-4f45-9708-019B960494DF}">
-              <a14:hiddenLine xmlns:a14="http://schemas.microsoft.com/office/drawing/2010/main" xmlns="" w="9525">
+              <a14:hiddenLine xmlns="" xmlns:a14="http://schemas.microsoft.com/office/drawing/2010/main" w="9525">
                 <a:solidFill>
                   <a:schemeClr val="tx1"/>
                 </a:solidFill>
@@ -16467,7 +16467,7 @@
               </a14:hiddenLine>
             </a:ext>
             <a:ext uri="{AF507438-7753-43e0-B8FC-AC1667EBCBE1}">
-              <a14:hiddenEffects xmlns:a14="http://schemas.microsoft.com/office/drawing/2010/main" xmlns="">
+              <a14:hiddenEffects xmlns="" xmlns:a14="http://schemas.microsoft.com/office/drawing/2010/main">
                 <a:effectLst>
                   <a:outerShdw blurRad="63500" dist="38099" dir="2700000" algn="ctr" rotWithShape="0">
                     <a:schemeClr val="bg2">
@@ -16986,14 +16986,14 @@
           <a:effectLst/>
           <a:extLst>
             <a:ext uri="{909E8E84-426E-40dd-AFC4-6F175D3DCCD1}">
-              <a14:hiddenFill xmlns:a14="http://schemas.microsoft.com/office/drawing/2010/main" xmlns="">
+              <a14:hiddenFill xmlns="" xmlns:a14="http://schemas.microsoft.com/office/drawing/2010/main">
                 <a:solidFill>
                   <a:schemeClr val="accent1"/>
                 </a:solidFill>
               </a14:hiddenFill>
             </a:ext>
             <a:ext uri="{91240B29-F687-4f45-9708-019B960494DF}">
-              <a14:hiddenLine xmlns:a14="http://schemas.microsoft.com/office/drawing/2010/main" xmlns="" w="9525">
+              <a14:hiddenLine xmlns="" xmlns:a14="http://schemas.microsoft.com/office/drawing/2010/main" w="9525">
                 <a:solidFill>
                   <a:schemeClr val="tx1"/>
                 </a:solidFill>
@@ -17003,7 +17003,7 @@
               </a14:hiddenLine>
             </a:ext>
             <a:ext uri="{AF507438-7753-43e0-B8FC-AC1667EBCBE1}">
-              <a14:hiddenEffects xmlns:a14="http://schemas.microsoft.com/office/drawing/2010/main" xmlns="">
+              <a14:hiddenEffects xmlns="" xmlns:a14="http://schemas.microsoft.com/office/drawing/2010/main">
                 <a:effectLst>
                   <a:outerShdw blurRad="63500" dist="38099" dir="2700000" algn="ctr" rotWithShape="0">
                     <a:schemeClr val="bg2">

</xml_diff>